<commit_message>
Add: Add Video Presentation Link on README
</commit_message>
<xml_diff>
--- a/docs/Portfolio Tracker Presentation.pptx
+++ b/docs/Portfolio Tracker Presentation.pptx
@@ -8,12 +8,13 @@
     <p:sldId id="256" r:id="rId2"/>
     <p:sldId id="261" r:id="rId3"/>
     <p:sldId id="257" r:id="rId4"/>
-    <p:sldId id="258" r:id="rId5"/>
-    <p:sldId id="259" r:id="rId6"/>
-    <p:sldId id="260" r:id="rId7"/>
-    <p:sldId id="262" r:id="rId8"/>
-    <p:sldId id="263" r:id="rId9"/>
-    <p:sldId id="264" r:id="rId10"/>
+    <p:sldId id="259" r:id="rId5"/>
+    <p:sldId id="260" r:id="rId6"/>
+    <p:sldId id="263" r:id="rId7"/>
+    <p:sldId id="258" r:id="rId8"/>
+    <p:sldId id="265" r:id="rId9"/>
+    <p:sldId id="262" r:id="rId10"/>
+    <p:sldId id="264" r:id="rId11"/>
   </p:sldIdLst>
   <p:sldSz cx="12192000" cy="6858000"/>
   <p:notesSz cx="6858000" cy="9144000"/>
@@ -3402,6 +3403,215 @@
 </p:sld>
 </file>
 
+<file path=ppt/slides/slide10.xml><?xml version="1.0" encoding="utf-8"?>
+<p:sld xmlns:a="http://schemas.openxmlformats.org/drawingml/2006/main" xmlns:r="http://schemas.openxmlformats.org/officeDocument/2006/relationships" xmlns:p="http://schemas.openxmlformats.org/presentationml/2006/main">
+  <p:cSld>
+    <p:spTree>
+      <p:nvGrpSpPr>
+        <p:cNvPr id="1" name=""/>
+        <p:cNvGrpSpPr/>
+        <p:nvPr/>
+      </p:nvGrpSpPr>
+      <p:grpSpPr>
+        <a:xfrm>
+          <a:off x="0" y="0"/>
+          <a:ext cx="0" cy="0"/>
+          <a:chOff x="0" y="0"/>
+          <a:chExt cx="0" cy="0"/>
+        </a:xfrm>
+      </p:grpSpPr>
+      <p:sp>
+        <p:nvSpPr>
+          <p:cNvPr id="2" name="Title 1">
+            <a:extLst>
+              <a:ext uri="{FF2B5EF4-FFF2-40B4-BE49-F238E27FC236}">
+                <a16:creationId xmlns:a16="http://schemas.microsoft.com/office/drawing/2014/main" id="{8F5541F5-9B9E-944A-9092-D92F1DE173A1}"/>
+              </a:ext>
+            </a:extLst>
+          </p:cNvPr>
+          <p:cNvSpPr>
+            <a:spLocks noGrp="1"/>
+          </p:cNvSpPr>
+          <p:nvPr>
+            <p:ph type="title"/>
+          </p:nvPr>
+        </p:nvSpPr>
+        <p:spPr/>
+        <p:txBody>
+          <a:bodyPr/>
+          <a:lstStyle/>
+          <a:p>
+            <a:r>
+              <a:rPr lang="en-US" dirty="0" err="1"/>
+              <a:t>Accessment</a:t>
+            </a:r>
+            <a:r>
+              <a:rPr lang="en-US" dirty="0"/>
+              <a:t> Criteria</a:t>
+            </a:r>
+          </a:p>
+        </p:txBody>
+      </p:sp>
+      <p:sp>
+        <p:nvSpPr>
+          <p:cNvPr id="3" name="Content Placeholder 2">
+            <a:extLst>
+              <a:ext uri="{FF2B5EF4-FFF2-40B4-BE49-F238E27FC236}">
+                <a16:creationId xmlns:a16="http://schemas.microsoft.com/office/drawing/2014/main" id="{F205189A-6FE3-2E4C-AC9C-9C0E138CBB26}"/>
+              </a:ext>
+            </a:extLst>
+          </p:cNvPr>
+          <p:cNvSpPr>
+            <a:spLocks noGrp="1"/>
+          </p:cNvSpPr>
+          <p:nvPr>
+            <p:ph idx="1"/>
+          </p:nvPr>
+        </p:nvSpPr>
+        <p:spPr/>
+        <p:txBody>
+          <a:bodyPr numCol="2">
+            <a:normAutofit fontScale="55000" lnSpcReduction="20000"/>
+          </a:bodyPr>
+          <a:lstStyle/>
+          <a:p>
+            <a:r>
+              <a:rPr lang="en-US" dirty="0"/>
+              <a:t>Create structured HTML &amp; CSS code.</a:t>
+            </a:r>
+          </a:p>
+          <a:p>
+            <a:r>
+              <a:rPr lang="en-US" dirty="0"/>
+              <a:t>Apply front-end best practices.</a:t>
+            </a:r>
+          </a:p>
+          <a:p>
+            <a:r>
+              <a:rPr lang="en-US" dirty="0"/>
+              <a:t>Ability to create UIs adjusted to given designs.</a:t>
+            </a:r>
+          </a:p>
+          <a:p>
+            <a:r>
+              <a:rPr lang="en-US" dirty="0"/>
+              <a:t>Implement basic OOP principles (encapsulation, inheritance, abstraction, polymorphism) in Ruby</a:t>
+            </a:r>
+          </a:p>
+          <a:p>
+            <a:r>
+              <a:rPr lang="en-US" dirty="0"/>
+              <a:t>Design DB schema based on real life example</a:t>
+            </a:r>
+          </a:p>
+          <a:p>
+            <a:r>
+              <a:rPr lang="en-US" dirty="0"/>
+              <a:t>Use MVP to structure backend code</a:t>
+            </a:r>
+          </a:p>
+          <a:p>
+            <a:r>
+              <a:rPr lang="en-US" dirty="0"/>
+              <a:t>Implement basic CRUD operations</a:t>
+            </a:r>
+          </a:p>
+          <a:p>
+            <a:r>
+              <a:rPr lang="en-US" dirty="0"/>
+              <a:t>Implement Active Record associations to model real life system</a:t>
+            </a:r>
+          </a:p>
+          <a:p>
+            <a:r>
+              <a:rPr lang="en-US" dirty="0"/>
+              <a:t>Implement a RESTful API with proper routes</a:t>
+            </a:r>
+          </a:p>
+          <a:p>
+            <a:r>
+              <a:rPr lang="en-US" dirty="0"/>
+              <a:t>Apply back-end best practices.</a:t>
+            </a:r>
+          </a:p>
+          <a:p>
+            <a:r>
+              <a:rPr lang="en-US" dirty="0"/>
+              <a:t>Send and receive data from a back-end endpoint</a:t>
+            </a:r>
+          </a:p>
+          <a:p>
+            <a:r>
+              <a:rPr lang="en-US" dirty="0"/>
+              <a:t>Implement interactive application respond to user interactions</a:t>
+            </a:r>
+          </a:p>
+          <a:p>
+            <a:r>
+              <a:rPr lang="en-US" dirty="0"/>
+              <a:t>Design a components structure for a website</a:t>
+            </a:r>
+          </a:p>
+          <a:p>
+            <a:r>
+              <a:rPr lang="en-US" dirty="0"/>
+              <a:t>Understand data management in front-end components</a:t>
+            </a:r>
+          </a:p>
+          <a:p>
+            <a:r>
+              <a:rPr lang="en-US" dirty="0"/>
+              <a:t>Manage front-end data using a shared state pattern</a:t>
+            </a:r>
+          </a:p>
+          <a:p>
+            <a:r>
+              <a:rPr lang="en-US" dirty="0"/>
+              <a:t>Ability to provide, as well as receive, feedback collaboratively and in a constructive manner. Coachable.</a:t>
+            </a:r>
+          </a:p>
+          <a:p>
+            <a:r>
+              <a:rPr lang="en-US" dirty="0"/>
+              <a:t>Never done learning and always seeking to improve themselves. Curious about new possibilities and acts to explore them.</a:t>
+            </a:r>
+          </a:p>
+          <a:p>
+            <a:r>
+              <a:rPr lang="en-US" dirty="0"/>
+              <a:t>Ability to perform tasks and complete projects with minimal supervision.</a:t>
+            </a:r>
+          </a:p>
+          <a:p>
+            <a:r>
+              <a:rPr lang="en-US" dirty="0"/>
+              <a:t>Ability to multitask and effectively manage time and prioritization.</a:t>
+            </a:r>
+          </a:p>
+          <a:p>
+            <a:r>
+              <a:rPr lang="en-US" dirty="0"/>
+              <a:t>Follow a industry standard workflow with version control system tools.</a:t>
+            </a:r>
+          </a:p>
+          <a:p>
+            <a:endParaRPr lang="en-US" dirty="0"/>
+          </a:p>
+        </p:txBody>
+      </p:sp>
+    </p:spTree>
+    <p:extLst>
+      <p:ext uri="{BB962C8B-B14F-4D97-AF65-F5344CB8AC3E}">
+        <p14:creationId xmlns:p14="http://schemas.microsoft.com/office/powerpoint/2010/main" val="4051499856"/>
+      </p:ext>
+    </p:extLst>
+  </p:cSld>
+  <p:clrMapOvr>
+    <a:masterClrMapping/>
+  </p:clrMapOvr>
+</p:sld>
+</file>
+
 <file path=ppt/slides/slide2.xml><?xml version="1.0" encoding="utf-8"?>
 <p:sld xmlns:a="http://schemas.openxmlformats.org/drawingml/2006/main" xmlns:r="http://schemas.openxmlformats.org/officeDocument/2006/relationships" xmlns:p="http://schemas.openxmlformats.org/presentationml/2006/main">
   <p:cSld>
@@ -3595,96 +3805,6 @@
           <a:chExt cx="0" cy="0"/>
         </a:xfrm>
       </p:grpSpPr>
-      <p:sp>
-        <p:nvSpPr>
-          <p:cNvPr id="2" name="Title 1">
-            <a:extLst>
-              <a:ext uri="{FF2B5EF4-FFF2-40B4-BE49-F238E27FC236}">
-                <a16:creationId xmlns:a16="http://schemas.microsoft.com/office/drawing/2014/main" id="{1E64B78E-F6C6-894B-A948-13FF5D0B0B0D}"/>
-              </a:ext>
-            </a:extLst>
-          </p:cNvPr>
-          <p:cNvSpPr>
-            <a:spLocks noGrp="1"/>
-          </p:cNvSpPr>
-          <p:nvPr>
-            <p:ph type="title"/>
-          </p:nvPr>
-        </p:nvSpPr>
-        <p:spPr/>
-        <p:txBody>
-          <a:bodyPr/>
-          <a:lstStyle/>
-          <a:p>
-            <a:r>
-              <a:rPr lang="en-US" dirty="0"/>
-              <a:t>Rails API – ERD Diagram</a:t>
-            </a:r>
-          </a:p>
-        </p:txBody>
-      </p:sp>
-      <p:pic>
-        <p:nvPicPr>
-          <p:cNvPr id="4" name="Content Placeholder 3">
-            <a:extLst>
-              <a:ext uri="{FF2B5EF4-FFF2-40B4-BE49-F238E27FC236}">
-                <a16:creationId xmlns:a16="http://schemas.microsoft.com/office/drawing/2014/main" id="{B2725E00-1E13-0249-AB71-B9C8F685D57C}"/>
-              </a:ext>
-            </a:extLst>
-          </p:cNvPr>
-          <p:cNvPicPr>
-            <a:picLocks noGrp="1" noChangeAspect="1"/>
-          </p:cNvPicPr>
-          <p:nvPr>
-            <p:ph idx="1"/>
-          </p:nvPr>
-        </p:nvPicPr>
-        <p:blipFill>
-          <a:blip r:embed="rId2"/>
-          <a:stretch>
-            <a:fillRect/>
-          </a:stretch>
-        </p:blipFill>
-        <p:spPr>
-          <a:xfrm>
-            <a:off x="2056677" y="1825625"/>
-            <a:ext cx="8078646" cy="4351338"/>
-          </a:xfrm>
-          <a:prstGeom prst="rect">
-            <a:avLst/>
-          </a:prstGeom>
-        </p:spPr>
-      </p:pic>
-    </p:spTree>
-    <p:extLst>
-      <p:ext uri="{BB962C8B-B14F-4D97-AF65-F5344CB8AC3E}">
-        <p14:creationId xmlns:p14="http://schemas.microsoft.com/office/powerpoint/2010/main" val="3195856150"/>
-      </p:ext>
-    </p:extLst>
-  </p:cSld>
-  <p:clrMapOvr>
-    <a:masterClrMapping/>
-  </p:clrMapOvr>
-</p:sld>
-</file>
-
-<file path=ppt/slides/slide5.xml><?xml version="1.0" encoding="utf-8"?>
-<p:sld xmlns:a="http://schemas.openxmlformats.org/drawingml/2006/main" xmlns:r="http://schemas.openxmlformats.org/officeDocument/2006/relationships" xmlns:p="http://schemas.openxmlformats.org/presentationml/2006/main">
-  <p:cSld>
-    <p:spTree>
-      <p:nvGrpSpPr>
-        <p:cNvPr id="1" name=""/>
-        <p:cNvGrpSpPr/>
-        <p:nvPr/>
-      </p:nvGrpSpPr>
-      <p:grpSpPr>
-        <a:xfrm>
-          <a:off x="0" y="0"/>
-          <a:ext cx="0" cy="0"/>
-          <a:chOff x="0" y="0"/>
-          <a:chExt cx="0" cy="0"/>
-        </a:xfrm>
-      </p:grpSpPr>
       <p:pic>
         <p:nvPicPr>
           <p:cNvPr id="7" name="Picture 6">
@@ -3896,7 +4016,7 @@
 </p:sld>
 </file>
 
-<file path=ppt/slides/slide6.xml><?xml version="1.0" encoding="utf-8"?>
+<file path=ppt/slides/slide5.xml><?xml version="1.0" encoding="utf-8"?>
 <p:sld xmlns:a="http://schemas.openxmlformats.org/drawingml/2006/main" xmlns:r="http://schemas.openxmlformats.org/officeDocument/2006/relationships" xmlns:p="http://schemas.openxmlformats.org/presentationml/2006/main">
   <p:cSld>
     <p:spTree>
@@ -4106,6 +4226,161 @@
     <p:extLst>
       <p:ext uri="{BB962C8B-B14F-4D97-AF65-F5344CB8AC3E}">
         <p14:creationId xmlns:p14="http://schemas.microsoft.com/office/powerpoint/2010/main" val="743009746"/>
+      </p:ext>
+    </p:extLst>
+  </p:cSld>
+  <p:clrMapOvr>
+    <a:masterClrMapping/>
+  </p:clrMapOvr>
+</p:sld>
+</file>
+
+<file path=ppt/slides/slide6.xml><?xml version="1.0" encoding="utf-8"?>
+<p:sld xmlns:a="http://schemas.openxmlformats.org/drawingml/2006/main" xmlns:r="http://schemas.openxmlformats.org/officeDocument/2006/relationships" xmlns:p="http://schemas.openxmlformats.org/presentationml/2006/main">
+  <p:cSld>
+    <p:spTree>
+      <p:nvGrpSpPr>
+        <p:cNvPr id="1" name=""/>
+        <p:cNvGrpSpPr/>
+        <p:nvPr/>
+      </p:nvGrpSpPr>
+      <p:grpSpPr>
+        <a:xfrm>
+          <a:off x="0" y="0"/>
+          <a:ext cx="0" cy="0"/>
+          <a:chOff x="0" y="0"/>
+          <a:chExt cx="0" cy="0"/>
+        </a:xfrm>
+      </p:grpSpPr>
+      <p:sp>
+        <p:nvSpPr>
+          <p:cNvPr id="2" name="Title 1">
+            <a:extLst>
+              <a:ext uri="{FF2B5EF4-FFF2-40B4-BE49-F238E27FC236}">
+                <a16:creationId xmlns:a16="http://schemas.microsoft.com/office/drawing/2014/main" id="{51CEBA4D-93A5-FF44-95A9-876226C60165}"/>
+              </a:ext>
+            </a:extLst>
+          </p:cNvPr>
+          <p:cNvSpPr>
+            <a:spLocks noGrp="1"/>
+          </p:cNvSpPr>
+          <p:nvPr>
+            <p:ph type="title"/>
+          </p:nvPr>
+        </p:nvSpPr>
+        <p:spPr/>
+        <p:txBody>
+          <a:bodyPr/>
+          <a:lstStyle/>
+          <a:p>
+            <a:r>
+              <a:rPr lang="en-US" dirty="0"/>
+              <a:t>Nice-To-Have Requirement</a:t>
+            </a:r>
+          </a:p>
+        </p:txBody>
+      </p:sp>
+      <p:sp>
+        <p:nvSpPr>
+          <p:cNvPr id="3" name="Content Placeholder 2">
+            <a:extLst>
+              <a:ext uri="{FF2B5EF4-FFF2-40B4-BE49-F238E27FC236}">
+                <a16:creationId xmlns:a16="http://schemas.microsoft.com/office/drawing/2014/main" id="{94BB6EF7-EEEE-E24E-A987-7B7A1F3365D2}"/>
+              </a:ext>
+            </a:extLst>
+          </p:cNvPr>
+          <p:cNvSpPr>
+            <a:spLocks noGrp="1"/>
+          </p:cNvSpPr>
+          <p:nvPr>
+            <p:ph idx="1"/>
+          </p:nvPr>
+        </p:nvSpPr>
+        <p:spPr>
+          <a:xfrm>
+            <a:off x="838200" y="1825625"/>
+            <a:ext cx="5257800" cy="4351338"/>
+          </a:xfrm>
+        </p:spPr>
+        <p:txBody>
+          <a:bodyPr>
+            <a:normAutofit fontScale="85000" lnSpcReduction="20000"/>
+          </a:bodyPr>
+          <a:lstStyle/>
+          <a:p>
+            <a:r>
+              <a:rPr lang="en-US" dirty="0">
+                <a:highlight>
+                  <a:srgbClr val="FF0000"/>
+                </a:highlight>
+              </a:rPr>
+              <a:t>Implement proper user authentication from the front-end to the server</a:t>
+            </a:r>
+          </a:p>
+          <a:p>
+            <a:r>
+              <a:rPr lang="en-US" dirty="0">
+                <a:highlight>
+                  <a:srgbClr val="00FF00"/>
+                </a:highlight>
+              </a:rPr>
+              <a:t>Create a user table in your database, so that </a:t>
+            </a:r>
+            <a:r>
+              <a:rPr lang="en-US" b="1" dirty="0">
+                <a:highlight>
+                  <a:srgbClr val="00FF00"/>
+                </a:highlight>
+              </a:rPr>
+              <a:t>a given user could only access the measurements they entered</a:t>
+            </a:r>
+          </a:p>
+          <a:p>
+            <a:r>
+              <a:rPr lang="en-US" dirty="0">
+                <a:highlight>
+                  <a:srgbClr val="FF0000"/>
+                </a:highlight>
+              </a:rPr>
+              <a:t>Create an admin panel to create / update / delete things to measure</a:t>
+            </a:r>
+          </a:p>
+          <a:p>
+            <a:r>
+              <a:rPr lang="en-US" dirty="0">
+                <a:highlight>
+                  <a:srgbClr val="00FF00"/>
+                </a:highlight>
+              </a:rPr>
+              <a:t>Make the app responsive, creating both tablet and desktop versions, following design guidelines</a:t>
+            </a:r>
+          </a:p>
+          <a:p>
+            <a:r>
+              <a:rPr lang="en-US" dirty="0">
+                <a:highlight>
+                  <a:srgbClr val="FFFF00"/>
+                </a:highlight>
+              </a:rPr>
+              <a:t>You could implement transitions to make user experience better</a:t>
+            </a:r>
+          </a:p>
+          <a:p>
+            <a:r>
+              <a:rPr lang="en-US" dirty="0">
+                <a:highlight>
+                  <a:srgbClr val="00FF00"/>
+                </a:highlight>
+              </a:rPr>
+              <a:t>You can implement the progress page with data charts</a:t>
+            </a:r>
+          </a:p>
+        </p:txBody>
+      </p:sp>
+    </p:spTree>
+    <p:extLst>
+      <p:ext uri="{BB962C8B-B14F-4D97-AF65-F5344CB8AC3E}">
+        <p14:creationId xmlns:p14="http://schemas.microsoft.com/office/powerpoint/2010/main" val="3893224695"/>
       </p:ext>
     </p:extLst>
   </p:cSld>
@@ -4137,7 +4412,7 @@
           <p:cNvPr id="2" name="Title 1">
             <a:extLst>
               <a:ext uri="{FF2B5EF4-FFF2-40B4-BE49-F238E27FC236}">
-                <a16:creationId xmlns:a16="http://schemas.microsoft.com/office/drawing/2014/main" id="{C3AED0BC-26D8-FE4B-A381-F6BC83B56BA9}"/>
+                <a16:creationId xmlns:a16="http://schemas.microsoft.com/office/drawing/2014/main" id="{1E64B78E-F6C6-894B-A948-13FF5D0B0B0D}"/>
               </a:ext>
             </a:extLst>
           </p:cNvPr>
@@ -4155,108 +4430,47 @@
           <a:p>
             <a:r>
               <a:rPr lang="en-US" dirty="0"/>
-              <a:t>Technical Mandatory</a:t>
-            </a:r>
-          </a:p>
-        </p:txBody>
-      </p:sp>
-      <p:sp>
-        <p:nvSpPr>
-          <p:cNvPr id="3" name="Content Placeholder 2">
-            <a:extLst>
-              <a:ext uri="{FF2B5EF4-FFF2-40B4-BE49-F238E27FC236}">
-                <a16:creationId xmlns:a16="http://schemas.microsoft.com/office/drawing/2014/main" id="{8F5E59CD-A072-7041-B237-B8406D25BE17}"/>
-              </a:ext>
-            </a:extLst>
-          </p:cNvPr>
-          <p:cNvSpPr>
-            <a:spLocks noGrp="1"/>
-          </p:cNvSpPr>
+              <a:t>Rails API – ERD Diagram</a:t>
+            </a:r>
+          </a:p>
+        </p:txBody>
+      </p:sp>
+      <p:pic>
+        <p:nvPicPr>
+          <p:cNvPr id="4" name="Content Placeholder 3">
+            <a:extLst>
+              <a:ext uri="{FF2B5EF4-FFF2-40B4-BE49-F238E27FC236}">
+                <a16:creationId xmlns:a16="http://schemas.microsoft.com/office/drawing/2014/main" id="{B2725E00-1E13-0249-AB71-B9C8F685D57C}"/>
+              </a:ext>
+            </a:extLst>
+          </p:cNvPr>
+          <p:cNvPicPr>
+            <a:picLocks noGrp="1" noChangeAspect="1"/>
+          </p:cNvPicPr>
           <p:nvPr>
             <p:ph idx="1"/>
           </p:nvPr>
-        </p:nvSpPr>
+        </p:nvPicPr>
+        <p:blipFill>
+          <a:blip r:embed="rId2"/>
+          <a:stretch>
+            <a:fillRect/>
+          </a:stretch>
+        </p:blipFill>
         <p:spPr>
           <a:xfrm>
-            <a:off x="838200" y="1825625"/>
-            <a:ext cx="5257800" cy="4351338"/>
+            <a:off x="2056677" y="1825625"/>
+            <a:ext cx="8078646" cy="4351338"/>
           </a:xfrm>
+          <a:prstGeom prst="rect">
+            <a:avLst/>
+          </a:prstGeom>
         </p:spPr>
-        <p:txBody>
-          <a:bodyPr>
-            <a:normAutofit fontScale="62500" lnSpcReduction="20000"/>
-          </a:bodyPr>
-          <a:lstStyle/>
-          <a:p>
-            <a:r>
-              <a:rPr lang="en-US" dirty="0"/>
-              <a:t>The project is a mobile web app</a:t>
-            </a:r>
-          </a:p>
-          <a:p>
-            <a:r>
-              <a:rPr lang="en-US" dirty="0"/>
-              <a:t>The database should have at least 2 tables — in this example, things to measure and measurements, </a:t>
-            </a:r>
-          </a:p>
-          <a:p>
-            <a:r>
-              <a:rPr lang="en-US" dirty="0"/>
-              <a:t>You should use Postgres as your database</a:t>
-            </a:r>
-          </a:p>
-          <a:p>
-            <a:r>
-              <a:rPr lang="en-US" dirty="0"/>
-              <a:t>For the back-end you will use Ruby on Rails </a:t>
-            </a:r>
-          </a:p>
-          <a:p>
-            <a:pPr lvl="1"/>
-            <a:r>
-              <a:rPr lang="en-US" dirty="0"/>
-              <a:t>You will create a REST API to manage database resources, in this case, measurements (things to measure could be added manually to the database or from an admin panel)</a:t>
-            </a:r>
-          </a:p>
-          <a:p>
-            <a:r>
-              <a:rPr lang="en-US" dirty="0"/>
-              <a:t>For the front-end you will use React </a:t>
-            </a:r>
-          </a:p>
-          <a:p>
-            <a:pPr lvl="1"/>
-            <a:r>
-              <a:rPr lang="en-US" dirty="0"/>
-              <a:t>Connects to the back-end API to send and receive domain data</a:t>
-            </a:r>
-          </a:p>
-          <a:p>
-            <a:pPr lvl="1"/>
-            <a:r>
-              <a:rPr lang="en-US" dirty="0"/>
-              <a:t>With routes for each of the screens, so the user can easily go back and forward</a:t>
-            </a:r>
-          </a:p>
-          <a:p>
-            <a:pPr lvl="1"/>
-            <a:r>
-              <a:rPr lang="en-US" dirty="0"/>
-              <a:t>Using redux to store info used across the app, like the username</a:t>
-            </a:r>
-          </a:p>
-          <a:p>
-            <a:r>
-              <a:rPr lang="en-US" dirty="0"/>
-              <a:t>The project will be deployed and accessible online</a:t>
-            </a:r>
-          </a:p>
-        </p:txBody>
-      </p:sp>
+      </p:pic>
     </p:spTree>
     <p:extLst>
       <p:ext uri="{BB962C8B-B14F-4D97-AF65-F5344CB8AC3E}">
-        <p14:creationId xmlns:p14="http://schemas.microsoft.com/office/powerpoint/2010/main" val="3710473357"/>
+        <p14:creationId xmlns:p14="http://schemas.microsoft.com/office/powerpoint/2010/main" val="3195856150"/>
       </p:ext>
     </p:extLst>
   </p:cSld>
@@ -4288,7 +4502,7 @@
           <p:cNvPr id="2" name="Title 1">
             <a:extLst>
               <a:ext uri="{FF2B5EF4-FFF2-40B4-BE49-F238E27FC236}">
-                <a16:creationId xmlns:a16="http://schemas.microsoft.com/office/drawing/2014/main" id="{51CEBA4D-93A5-FF44-95A9-876226C60165}"/>
+                <a16:creationId xmlns:a16="http://schemas.microsoft.com/office/drawing/2014/main" id="{C319DE5F-B588-6C45-BD51-FDF2EB5388D3}"/>
               </a:ext>
             </a:extLst>
           </p:cNvPr>
@@ -4306,7 +4520,7 @@
           <a:p>
             <a:r>
               <a:rPr lang="en-US" dirty="0"/>
-              <a:t>Nice-To-Have Requirement</a:t>
+              <a:t>App’s state &amp; actions</a:t>
             </a:r>
           </a:p>
         </p:txBody>
@@ -4316,7 +4530,7 @@
           <p:cNvPr id="3" name="Content Placeholder 2">
             <a:extLst>
               <a:ext uri="{FF2B5EF4-FFF2-40B4-BE49-F238E27FC236}">
-                <a16:creationId xmlns:a16="http://schemas.microsoft.com/office/drawing/2014/main" id="{94BB6EF7-EEEE-E24E-A987-7B7A1F3365D2}"/>
+                <a16:creationId xmlns:a16="http://schemas.microsoft.com/office/drawing/2014/main" id="{8026A437-9FF2-B24A-9511-BE84FA03762A}"/>
               </a:ext>
             </a:extLst>
           </p:cNvPr>
@@ -4330,80 +4544,1908 @@
         <p:spPr>
           <a:xfrm>
             <a:off x="838200" y="1825625"/>
-            <a:ext cx="5257800" cy="4351338"/>
+            <a:ext cx="4659351" cy="4351338"/>
           </a:xfrm>
         </p:spPr>
         <p:txBody>
-          <a:bodyPr>
-            <a:normAutofit fontScale="85000" lnSpcReduction="20000"/>
-          </a:bodyPr>
+          <a:bodyPr/>
           <a:lstStyle/>
           <a:p>
             <a:r>
               <a:rPr lang="en-US" dirty="0"/>
-              <a:t>Implement proper user authentication from the front-end to the server</a:t>
-            </a:r>
-          </a:p>
-          <a:p>
-            <a:r>
-              <a:rPr lang="en-US" dirty="0">
-                <a:highlight>
-                  <a:srgbClr val="00FF00"/>
-                </a:highlight>
-              </a:rPr>
-              <a:t>Create a user table in your database, so that </a:t>
-            </a:r>
-            <a:r>
-              <a:rPr lang="en-US" b="1" dirty="0">
-                <a:highlight>
-                  <a:srgbClr val="00FF00"/>
-                </a:highlight>
-              </a:rPr>
-              <a:t>a given user could only access the measurements they entered</a:t>
+              <a:t>User object is stored in browser’s cookie.</a:t>
             </a:r>
           </a:p>
           <a:p>
             <a:r>
               <a:rPr lang="en-US" dirty="0"/>
-              <a:t>Create an admin panel to create / update / delete things to measure</a:t>
-            </a:r>
-          </a:p>
-          <a:p>
-            <a:r>
-              <a:rPr lang="en-US" dirty="0">
-                <a:highlight>
-                  <a:srgbClr val="00FF00"/>
-                </a:highlight>
-              </a:rPr>
-              <a:t>Make the app responsive, creating both tablet and desktop versions, following design guidelines</a:t>
-            </a:r>
-          </a:p>
-          <a:p>
-            <a:r>
-              <a:rPr lang="en-US" dirty="0">
-                <a:highlight>
-                  <a:srgbClr val="FFFF00"/>
-                </a:highlight>
-              </a:rPr>
-              <a:t>You could implement transitions to make user experience better</a:t>
-            </a:r>
-          </a:p>
-          <a:p>
-            <a:r>
-              <a:rPr lang="en-US" dirty="0">
-                <a:highlight>
-                  <a:srgbClr val="00FF00"/>
-                </a:highlight>
-              </a:rPr>
-              <a:t>You can implement the progress page with data charts</a:t>
-            </a:r>
+              <a:t>!! user return true / false</a:t>
+            </a:r>
+          </a:p>
+          <a:p>
+            <a:r>
+              <a:rPr lang="en-US" dirty="0"/>
+              <a:t>5 actions, FETCH_USERS run on initial visit, to fetch an array of user objects</a:t>
+            </a:r>
+          </a:p>
+          <a:p>
+            <a:r>
+              <a:rPr lang="en-US" dirty="0"/>
+              <a:t>Login to set user object</a:t>
+            </a:r>
+          </a:p>
+        </p:txBody>
+      </p:sp>
+      <p:pic>
+        <p:nvPicPr>
+          <p:cNvPr id="6" name="Picture 5">
+            <a:extLst>
+              <a:ext uri="{FF2B5EF4-FFF2-40B4-BE49-F238E27FC236}">
+                <a16:creationId xmlns:a16="http://schemas.microsoft.com/office/drawing/2014/main" id="{EBEE3730-BAAB-C145-B328-5E86C1DBF4B7}"/>
+              </a:ext>
+            </a:extLst>
+          </p:cNvPr>
+          <p:cNvPicPr>
+            <a:picLocks noChangeAspect="1"/>
+          </p:cNvPicPr>
+          <p:nvPr/>
+        </p:nvPicPr>
+        <p:blipFill>
+          <a:blip r:embed="rId2"/>
+          <a:stretch>
+            <a:fillRect/>
+          </a:stretch>
+        </p:blipFill>
+        <p:spPr>
+          <a:xfrm>
+            <a:off x="6261100" y="1289244"/>
+            <a:ext cx="5092700" cy="2819400"/>
+          </a:xfrm>
+          <a:prstGeom prst="rect">
+            <a:avLst/>
+          </a:prstGeom>
+        </p:spPr>
+      </p:pic>
+      <p:pic>
+        <p:nvPicPr>
+          <p:cNvPr id="7" name="Picture 6">
+            <a:extLst>
+              <a:ext uri="{FF2B5EF4-FFF2-40B4-BE49-F238E27FC236}">
+                <a16:creationId xmlns:a16="http://schemas.microsoft.com/office/drawing/2014/main" id="{464AB865-00EC-D54E-A913-1131B2440832}"/>
+              </a:ext>
+            </a:extLst>
+          </p:cNvPr>
+          <p:cNvPicPr>
+            <a:picLocks noChangeAspect="1"/>
+          </p:cNvPicPr>
+          <p:nvPr/>
+        </p:nvPicPr>
+        <p:blipFill>
+          <a:blip r:embed="rId3"/>
+          <a:stretch>
+            <a:fillRect/>
+          </a:stretch>
+        </p:blipFill>
+        <p:spPr>
+          <a:xfrm>
+            <a:off x="5765800" y="4487863"/>
+            <a:ext cx="6083300" cy="1689100"/>
+          </a:xfrm>
+          <a:prstGeom prst="rect">
+            <a:avLst/>
+          </a:prstGeom>
+        </p:spPr>
+      </p:pic>
+      <p:sp>
+        <p:nvSpPr>
+          <p:cNvPr id="17" name="Freeform 16">
+            <a:extLst>
+              <a:ext uri="{FF2B5EF4-FFF2-40B4-BE49-F238E27FC236}">
+                <a16:creationId xmlns:a16="http://schemas.microsoft.com/office/drawing/2014/main" id="{A40DE8CA-7153-1340-B943-45FDBDE6B250}"/>
+              </a:ext>
+            </a:extLst>
+          </p:cNvPr>
+          <p:cNvSpPr/>
+          <p:nvPr/>
+        </p:nvSpPr>
+        <p:spPr>
+          <a:xfrm>
+            <a:off x="5260671" y="2865863"/>
+            <a:ext cx="1000429" cy="2141035"/>
+          </a:xfrm>
+          <a:custGeom>
+            <a:avLst/>
+            <a:gdLst>
+              <a:gd name="connsiteX0" fmla="*/ 493358 w 939407"/>
+              <a:gd name="connsiteY0" fmla="*/ 2096430 h 2096430"/>
+              <a:gd name="connsiteX1" fmla="*/ 415300 w 939407"/>
+              <a:gd name="connsiteY1" fmla="*/ 2085278 h 2096430"/>
+              <a:gd name="connsiteX2" fmla="*/ 337241 w 939407"/>
+              <a:gd name="connsiteY2" fmla="*/ 2029522 h 2096430"/>
+              <a:gd name="connsiteX3" fmla="*/ 270334 w 939407"/>
+              <a:gd name="connsiteY3" fmla="*/ 1984917 h 2096430"/>
+              <a:gd name="connsiteX4" fmla="*/ 236880 w 939407"/>
+              <a:gd name="connsiteY4" fmla="*/ 1962615 h 2096430"/>
+              <a:gd name="connsiteX5" fmla="*/ 192275 w 939407"/>
+              <a:gd name="connsiteY5" fmla="*/ 1918010 h 2096430"/>
+              <a:gd name="connsiteX6" fmla="*/ 114217 w 939407"/>
+              <a:gd name="connsiteY6" fmla="*/ 1862254 h 2096430"/>
+              <a:gd name="connsiteX7" fmla="*/ 69612 w 939407"/>
+              <a:gd name="connsiteY7" fmla="*/ 1795347 h 2096430"/>
+              <a:gd name="connsiteX8" fmla="*/ 13856 w 939407"/>
+              <a:gd name="connsiteY8" fmla="*/ 1639230 h 2096430"/>
+              <a:gd name="connsiteX9" fmla="*/ 25007 w 939407"/>
+              <a:gd name="connsiteY9" fmla="*/ 981308 h 2096430"/>
+              <a:gd name="connsiteX10" fmla="*/ 69612 w 939407"/>
+              <a:gd name="connsiteY10" fmla="*/ 858644 h 2096430"/>
+              <a:gd name="connsiteX11" fmla="*/ 103066 w 939407"/>
+              <a:gd name="connsiteY11" fmla="*/ 758283 h 2096430"/>
+              <a:gd name="connsiteX12" fmla="*/ 136519 w 939407"/>
+              <a:gd name="connsiteY12" fmla="*/ 724830 h 2096430"/>
+              <a:gd name="connsiteX13" fmla="*/ 236880 w 939407"/>
+              <a:gd name="connsiteY13" fmla="*/ 591015 h 2096430"/>
+              <a:gd name="connsiteX14" fmla="*/ 259183 w 939407"/>
+              <a:gd name="connsiteY14" fmla="*/ 356839 h 2096430"/>
+              <a:gd name="connsiteX15" fmla="*/ 303788 w 939407"/>
+              <a:gd name="connsiteY15" fmla="*/ 278781 h 2096430"/>
+              <a:gd name="connsiteX16" fmla="*/ 348392 w 939407"/>
+              <a:gd name="connsiteY16" fmla="*/ 178420 h 2096430"/>
+              <a:gd name="connsiteX17" fmla="*/ 448753 w 939407"/>
+              <a:gd name="connsiteY17" fmla="*/ 122664 h 2096430"/>
+              <a:gd name="connsiteX18" fmla="*/ 493358 w 939407"/>
+              <a:gd name="connsiteY18" fmla="*/ 111512 h 2096430"/>
+              <a:gd name="connsiteX19" fmla="*/ 560266 w 939407"/>
+              <a:gd name="connsiteY19" fmla="*/ 89210 h 2096430"/>
+              <a:gd name="connsiteX20" fmla="*/ 627173 w 939407"/>
+              <a:gd name="connsiteY20" fmla="*/ 66908 h 2096430"/>
+              <a:gd name="connsiteX21" fmla="*/ 660627 w 939407"/>
+              <a:gd name="connsiteY21" fmla="*/ 55756 h 2096430"/>
+              <a:gd name="connsiteX22" fmla="*/ 727534 w 939407"/>
+              <a:gd name="connsiteY22" fmla="*/ 44605 h 2096430"/>
+              <a:gd name="connsiteX23" fmla="*/ 805592 w 939407"/>
+              <a:gd name="connsiteY23" fmla="*/ 22303 h 2096430"/>
+              <a:gd name="connsiteX24" fmla="*/ 883651 w 939407"/>
+              <a:gd name="connsiteY24" fmla="*/ 11152 h 2096430"/>
+              <a:gd name="connsiteX25" fmla="*/ 939407 w 939407"/>
+              <a:gd name="connsiteY25" fmla="*/ 0 h 2096430"/>
+            </a:gdLst>
+            <a:ahLst/>
+            <a:cxnLst>
+              <a:cxn ang="0">
+                <a:pos x="connsiteX0" y="connsiteY0"/>
+              </a:cxn>
+              <a:cxn ang="0">
+                <a:pos x="connsiteX1" y="connsiteY1"/>
+              </a:cxn>
+              <a:cxn ang="0">
+                <a:pos x="connsiteX2" y="connsiteY2"/>
+              </a:cxn>
+              <a:cxn ang="0">
+                <a:pos x="connsiteX3" y="connsiteY3"/>
+              </a:cxn>
+              <a:cxn ang="0">
+                <a:pos x="connsiteX4" y="connsiteY4"/>
+              </a:cxn>
+              <a:cxn ang="0">
+                <a:pos x="connsiteX5" y="connsiteY5"/>
+              </a:cxn>
+              <a:cxn ang="0">
+                <a:pos x="connsiteX6" y="connsiteY6"/>
+              </a:cxn>
+              <a:cxn ang="0">
+                <a:pos x="connsiteX7" y="connsiteY7"/>
+              </a:cxn>
+              <a:cxn ang="0">
+                <a:pos x="connsiteX8" y="connsiteY8"/>
+              </a:cxn>
+              <a:cxn ang="0">
+                <a:pos x="connsiteX9" y="connsiteY9"/>
+              </a:cxn>
+              <a:cxn ang="0">
+                <a:pos x="connsiteX10" y="connsiteY10"/>
+              </a:cxn>
+              <a:cxn ang="0">
+                <a:pos x="connsiteX11" y="connsiteY11"/>
+              </a:cxn>
+              <a:cxn ang="0">
+                <a:pos x="connsiteX12" y="connsiteY12"/>
+              </a:cxn>
+              <a:cxn ang="0">
+                <a:pos x="connsiteX13" y="connsiteY13"/>
+              </a:cxn>
+              <a:cxn ang="0">
+                <a:pos x="connsiteX14" y="connsiteY14"/>
+              </a:cxn>
+              <a:cxn ang="0">
+                <a:pos x="connsiteX15" y="connsiteY15"/>
+              </a:cxn>
+              <a:cxn ang="0">
+                <a:pos x="connsiteX16" y="connsiteY16"/>
+              </a:cxn>
+              <a:cxn ang="0">
+                <a:pos x="connsiteX17" y="connsiteY17"/>
+              </a:cxn>
+              <a:cxn ang="0">
+                <a:pos x="connsiteX18" y="connsiteY18"/>
+              </a:cxn>
+              <a:cxn ang="0">
+                <a:pos x="connsiteX19" y="connsiteY19"/>
+              </a:cxn>
+              <a:cxn ang="0">
+                <a:pos x="connsiteX20" y="connsiteY20"/>
+              </a:cxn>
+              <a:cxn ang="0">
+                <a:pos x="connsiteX21" y="connsiteY21"/>
+              </a:cxn>
+              <a:cxn ang="0">
+                <a:pos x="connsiteX22" y="connsiteY22"/>
+              </a:cxn>
+              <a:cxn ang="0">
+                <a:pos x="connsiteX23" y="connsiteY23"/>
+              </a:cxn>
+              <a:cxn ang="0">
+                <a:pos x="connsiteX24" y="connsiteY24"/>
+              </a:cxn>
+              <a:cxn ang="0">
+                <a:pos x="connsiteX25" y="connsiteY25"/>
+              </a:cxn>
+            </a:cxnLst>
+            <a:rect l="l" t="t" r="r" b="b"/>
+            <a:pathLst>
+              <a:path w="939407" h="2096430">
+                <a:moveTo>
+                  <a:pt x="493358" y="2096430"/>
+                </a:moveTo>
+                <a:cubicBezTo>
+                  <a:pt x="467339" y="2092713"/>
+                  <a:pt x="440657" y="2092194"/>
+                  <a:pt x="415300" y="2085278"/>
+                </a:cubicBezTo>
+                <a:cubicBezTo>
+                  <a:pt x="362040" y="2070752"/>
+                  <a:pt x="377278" y="2060662"/>
+                  <a:pt x="337241" y="2029522"/>
+                </a:cubicBezTo>
+                <a:cubicBezTo>
+                  <a:pt x="316083" y="2013066"/>
+                  <a:pt x="292636" y="1999785"/>
+                  <a:pt x="270334" y="1984917"/>
+                </a:cubicBezTo>
+                <a:cubicBezTo>
+                  <a:pt x="259183" y="1977483"/>
+                  <a:pt x="246357" y="1972092"/>
+                  <a:pt x="236880" y="1962615"/>
+                </a:cubicBezTo>
+                <a:cubicBezTo>
+                  <a:pt x="222012" y="1947747"/>
+                  <a:pt x="209097" y="1930626"/>
+                  <a:pt x="192275" y="1918010"/>
+                </a:cubicBezTo>
+                <a:cubicBezTo>
+                  <a:pt x="136949" y="1876515"/>
+                  <a:pt x="163134" y="1894865"/>
+                  <a:pt x="114217" y="1862254"/>
+                </a:cubicBezTo>
+                <a:cubicBezTo>
+                  <a:pt x="99349" y="1839952"/>
+                  <a:pt x="79567" y="1820234"/>
+                  <a:pt x="69612" y="1795347"/>
+                </a:cubicBezTo>
+                <a:cubicBezTo>
+                  <a:pt x="19315" y="1669605"/>
+                  <a:pt x="34717" y="1722673"/>
+                  <a:pt x="13856" y="1639230"/>
+                </a:cubicBezTo>
+                <a:cubicBezTo>
+                  <a:pt x="-7863" y="1335159"/>
+                  <a:pt x="-3979" y="1474082"/>
+                  <a:pt x="25007" y="981308"/>
+                </a:cubicBezTo>
+                <a:cubicBezTo>
+                  <a:pt x="29165" y="910613"/>
+                  <a:pt x="34644" y="916924"/>
+                  <a:pt x="69612" y="858644"/>
+                </a:cubicBezTo>
+                <a:cubicBezTo>
+                  <a:pt x="78175" y="815830"/>
+                  <a:pt x="77416" y="794193"/>
+                  <a:pt x="103066" y="758283"/>
+                </a:cubicBezTo>
+                <a:cubicBezTo>
+                  <a:pt x="112232" y="745451"/>
+                  <a:pt x="126423" y="736945"/>
+                  <a:pt x="136519" y="724830"/>
+                </a:cubicBezTo>
+                <a:cubicBezTo>
+                  <a:pt x="198158" y="650864"/>
+                  <a:pt x="198864" y="648041"/>
+                  <a:pt x="236880" y="591015"/>
+                </a:cubicBezTo>
+                <a:cubicBezTo>
+                  <a:pt x="238168" y="570402"/>
+                  <a:pt x="239857" y="414817"/>
+                  <a:pt x="259183" y="356839"/>
+                </a:cubicBezTo>
+                <a:cubicBezTo>
+                  <a:pt x="268617" y="328538"/>
+                  <a:pt x="287471" y="303256"/>
+                  <a:pt x="303788" y="278781"/>
+                </a:cubicBezTo>
+                <a:cubicBezTo>
+                  <a:pt x="312094" y="253861"/>
+                  <a:pt x="323444" y="200249"/>
+                  <a:pt x="348392" y="178420"/>
+                </a:cubicBezTo>
+                <a:cubicBezTo>
+                  <a:pt x="387119" y="144534"/>
+                  <a:pt x="406518" y="134732"/>
+                  <a:pt x="448753" y="122664"/>
+                </a:cubicBezTo>
+                <a:cubicBezTo>
+                  <a:pt x="463489" y="118454"/>
+                  <a:pt x="478678" y="115916"/>
+                  <a:pt x="493358" y="111512"/>
+                </a:cubicBezTo>
+                <a:cubicBezTo>
+                  <a:pt x="515876" y="104757"/>
+                  <a:pt x="537963" y="96644"/>
+                  <a:pt x="560266" y="89210"/>
+                </a:cubicBezTo>
+                <a:lnTo>
+                  <a:pt x="627173" y="66908"/>
+                </a:lnTo>
+                <a:cubicBezTo>
+                  <a:pt x="638324" y="63191"/>
+                  <a:pt x="649032" y="57688"/>
+                  <a:pt x="660627" y="55756"/>
+                </a:cubicBezTo>
+                <a:cubicBezTo>
+                  <a:pt x="682929" y="52039"/>
+                  <a:pt x="705462" y="49510"/>
+                  <a:pt x="727534" y="44605"/>
+                </a:cubicBezTo>
+                <a:cubicBezTo>
+                  <a:pt x="835011" y="20722"/>
+                  <a:pt x="672029" y="46587"/>
+                  <a:pt x="805592" y="22303"/>
+                </a:cubicBezTo>
+                <a:cubicBezTo>
+                  <a:pt x="831452" y="17601"/>
+                  <a:pt x="857725" y="15473"/>
+                  <a:pt x="883651" y="11152"/>
+                </a:cubicBezTo>
+                <a:cubicBezTo>
+                  <a:pt x="902347" y="8036"/>
+                  <a:pt x="939407" y="0"/>
+                  <a:pt x="939407" y="0"/>
+                </a:cubicBezTo>
+              </a:path>
+            </a:pathLst>
+          </a:custGeom>
+          <a:ln>
+            <a:solidFill>
+              <a:srgbClr val="00B050"/>
+            </a:solidFill>
+          </a:ln>
+        </p:spPr>
+        <p:style>
+          <a:lnRef idx="3">
+            <a:schemeClr val="dk1"/>
+          </a:lnRef>
+          <a:fillRef idx="0">
+            <a:schemeClr val="dk1"/>
+          </a:fillRef>
+          <a:effectRef idx="2">
+            <a:schemeClr val="dk1"/>
+          </a:effectRef>
+          <a:fontRef idx="minor">
+            <a:schemeClr val="tx1"/>
+          </a:fontRef>
+        </p:style>
+        <p:txBody>
+          <a:bodyPr rtlCol="0" anchor="ctr"/>
+          <a:lstStyle/>
+          <a:p>
+            <a:pPr algn="ctr"/>
+            <a:endParaRPr lang="en-US"/>
+          </a:p>
+        </p:txBody>
+      </p:sp>
+      <p:sp>
+        <p:nvSpPr>
+          <p:cNvPr id="18" name="Freeform 17">
+            <a:extLst>
+              <a:ext uri="{FF2B5EF4-FFF2-40B4-BE49-F238E27FC236}">
+                <a16:creationId xmlns:a16="http://schemas.microsoft.com/office/drawing/2014/main" id="{391CD391-E186-8342-B7A8-4E694D89B0FB}"/>
+              </a:ext>
+            </a:extLst>
+          </p:cNvPr>
+          <p:cNvSpPr/>
+          <p:nvPr/>
+        </p:nvSpPr>
+        <p:spPr>
+          <a:xfrm>
+            <a:off x="5352585" y="2542478"/>
+            <a:ext cx="880947" cy="2159575"/>
+          </a:xfrm>
+          <a:custGeom>
+            <a:avLst/>
+            <a:gdLst>
+              <a:gd name="connsiteX0" fmla="*/ 880947 w 880947"/>
+              <a:gd name="connsiteY0" fmla="*/ 0 h 2159575"/>
+              <a:gd name="connsiteX1" fmla="*/ 769435 w 880947"/>
+              <a:gd name="connsiteY1" fmla="*/ 44605 h 2159575"/>
+              <a:gd name="connsiteX2" fmla="*/ 713678 w 880947"/>
+              <a:gd name="connsiteY2" fmla="*/ 66907 h 2159575"/>
+              <a:gd name="connsiteX3" fmla="*/ 646771 w 880947"/>
+              <a:gd name="connsiteY3" fmla="*/ 89210 h 2159575"/>
+              <a:gd name="connsiteX4" fmla="*/ 579864 w 880947"/>
+              <a:gd name="connsiteY4" fmla="*/ 122663 h 2159575"/>
+              <a:gd name="connsiteX5" fmla="*/ 434898 w 880947"/>
+              <a:gd name="connsiteY5" fmla="*/ 156117 h 2159575"/>
+              <a:gd name="connsiteX6" fmla="*/ 356839 w 880947"/>
+              <a:gd name="connsiteY6" fmla="*/ 178420 h 2159575"/>
+              <a:gd name="connsiteX7" fmla="*/ 323386 w 880947"/>
+              <a:gd name="connsiteY7" fmla="*/ 189571 h 2159575"/>
+              <a:gd name="connsiteX8" fmla="*/ 301083 w 880947"/>
+              <a:gd name="connsiteY8" fmla="*/ 211873 h 2159575"/>
+              <a:gd name="connsiteX9" fmla="*/ 278781 w 880947"/>
+              <a:gd name="connsiteY9" fmla="*/ 256478 h 2159575"/>
+              <a:gd name="connsiteX10" fmla="*/ 267630 w 880947"/>
+              <a:gd name="connsiteY10" fmla="*/ 301083 h 2159575"/>
+              <a:gd name="connsiteX11" fmla="*/ 234176 w 880947"/>
+              <a:gd name="connsiteY11" fmla="*/ 345688 h 2159575"/>
+              <a:gd name="connsiteX12" fmla="*/ 200722 w 880947"/>
+              <a:gd name="connsiteY12" fmla="*/ 434898 h 2159575"/>
+              <a:gd name="connsiteX13" fmla="*/ 167269 w 880947"/>
+              <a:gd name="connsiteY13" fmla="*/ 546410 h 2159575"/>
+              <a:gd name="connsiteX14" fmla="*/ 133815 w 880947"/>
+              <a:gd name="connsiteY14" fmla="*/ 613317 h 2159575"/>
+              <a:gd name="connsiteX15" fmla="*/ 89210 w 880947"/>
+              <a:gd name="connsiteY15" fmla="*/ 791737 h 2159575"/>
+              <a:gd name="connsiteX16" fmla="*/ 78059 w 880947"/>
+              <a:gd name="connsiteY16" fmla="*/ 858644 h 2159575"/>
+              <a:gd name="connsiteX17" fmla="*/ 55756 w 880947"/>
+              <a:gd name="connsiteY17" fmla="*/ 947854 h 2159575"/>
+              <a:gd name="connsiteX18" fmla="*/ 44605 w 880947"/>
+              <a:gd name="connsiteY18" fmla="*/ 1025912 h 2159575"/>
+              <a:gd name="connsiteX19" fmla="*/ 33454 w 880947"/>
+              <a:gd name="connsiteY19" fmla="*/ 1059366 h 2159575"/>
+              <a:gd name="connsiteX20" fmla="*/ 11152 w 880947"/>
+              <a:gd name="connsiteY20" fmla="*/ 1148576 h 2159575"/>
+              <a:gd name="connsiteX21" fmla="*/ 0 w 880947"/>
+              <a:gd name="connsiteY21" fmla="*/ 1349298 h 2159575"/>
+              <a:gd name="connsiteX22" fmla="*/ 33454 w 880947"/>
+              <a:gd name="connsiteY22" fmla="*/ 1516566 h 2159575"/>
+              <a:gd name="connsiteX23" fmla="*/ 44605 w 880947"/>
+              <a:gd name="connsiteY23" fmla="*/ 1550020 h 2159575"/>
+              <a:gd name="connsiteX24" fmla="*/ 66908 w 880947"/>
+              <a:gd name="connsiteY24" fmla="*/ 1583473 h 2159575"/>
+              <a:gd name="connsiteX25" fmla="*/ 89210 w 880947"/>
+              <a:gd name="connsiteY25" fmla="*/ 1650381 h 2159575"/>
+              <a:gd name="connsiteX26" fmla="*/ 100361 w 880947"/>
+              <a:gd name="connsiteY26" fmla="*/ 1683834 h 2159575"/>
+              <a:gd name="connsiteX27" fmla="*/ 122664 w 880947"/>
+              <a:gd name="connsiteY27" fmla="*/ 1717288 h 2159575"/>
+              <a:gd name="connsiteX28" fmla="*/ 167269 w 880947"/>
+              <a:gd name="connsiteY28" fmla="*/ 1806498 h 2159575"/>
+              <a:gd name="connsiteX29" fmla="*/ 189571 w 880947"/>
+              <a:gd name="connsiteY29" fmla="*/ 1884556 h 2159575"/>
+              <a:gd name="connsiteX30" fmla="*/ 211874 w 880947"/>
+              <a:gd name="connsiteY30" fmla="*/ 1906859 h 2159575"/>
+              <a:gd name="connsiteX31" fmla="*/ 245327 w 880947"/>
+              <a:gd name="connsiteY31" fmla="*/ 1973766 h 2159575"/>
+              <a:gd name="connsiteX32" fmla="*/ 278781 w 880947"/>
+              <a:gd name="connsiteY32" fmla="*/ 2040673 h 2159575"/>
+              <a:gd name="connsiteX33" fmla="*/ 323386 w 880947"/>
+              <a:gd name="connsiteY33" fmla="*/ 2096429 h 2159575"/>
+              <a:gd name="connsiteX34" fmla="*/ 334537 w 880947"/>
+              <a:gd name="connsiteY34" fmla="*/ 2129883 h 2159575"/>
+              <a:gd name="connsiteX35" fmla="*/ 412595 w 880947"/>
+              <a:gd name="connsiteY35" fmla="*/ 2141034 h 2159575"/>
+            </a:gdLst>
+            <a:ahLst/>
+            <a:cxnLst>
+              <a:cxn ang="0">
+                <a:pos x="connsiteX0" y="connsiteY0"/>
+              </a:cxn>
+              <a:cxn ang="0">
+                <a:pos x="connsiteX1" y="connsiteY1"/>
+              </a:cxn>
+              <a:cxn ang="0">
+                <a:pos x="connsiteX2" y="connsiteY2"/>
+              </a:cxn>
+              <a:cxn ang="0">
+                <a:pos x="connsiteX3" y="connsiteY3"/>
+              </a:cxn>
+              <a:cxn ang="0">
+                <a:pos x="connsiteX4" y="connsiteY4"/>
+              </a:cxn>
+              <a:cxn ang="0">
+                <a:pos x="connsiteX5" y="connsiteY5"/>
+              </a:cxn>
+              <a:cxn ang="0">
+                <a:pos x="connsiteX6" y="connsiteY6"/>
+              </a:cxn>
+              <a:cxn ang="0">
+                <a:pos x="connsiteX7" y="connsiteY7"/>
+              </a:cxn>
+              <a:cxn ang="0">
+                <a:pos x="connsiteX8" y="connsiteY8"/>
+              </a:cxn>
+              <a:cxn ang="0">
+                <a:pos x="connsiteX9" y="connsiteY9"/>
+              </a:cxn>
+              <a:cxn ang="0">
+                <a:pos x="connsiteX10" y="connsiteY10"/>
+              </a:cxn>
+              <a:cxn ang="0">
+                <a:pos x="connsiteX11" y="connsiteY11"/>
+              </a:cxn>
+              <a:cxn ang="0">
+                <a:pos x="connsiteX12" y="connsiteY12"/>
+              </a:cxn>
+              <a:cxn ang="0">
+                <a:pos x="connsiteX13" y="connsiteY13"/>
+              </a:cxn>
+              <a:cxn ang="0">
+                <a:pos x="connsiteX14" y="connsiteY14"/>
+              </a:cxn>
+              <a:cxn ang="0">
+                <a:pos x="connsiteX15" y="connsiteY15"/>
+              </a:cxn>
+              <a:cxn ang="0">
+                <a:pos x="connsiteX16" y="connsiteY16"/>
+              </a:cxn>
+              <a:cxn ang="0">
+                <a:pos x="connsiteX17" y="connsiteY17"/>
+              </a:cxn>
+              <a:cxn ang="0">
+                <a:pos x="connsiteX18" y="connsiteY18"/>
+              </a:cxn>
+              <a:cxn ang="0">
+                <a:pos x="connsiteX19" y="connsiteY19"/>
+              </a:cxn>
+              <a:cxn ang="0">
+                <a:pos x="connsiteX20" y="connsiteY20"/>
+              </a:cxn>
+              <a:cxn ang="0">
+                <a:pos x="connsiteX21" y="connsiteY21"/>
+              </a:cxn>
+              <a:cxn ang="0">
+                <a:pos x="connsiteX22" y="connsiteY22"/>
+              </a:cxn>
+              <a:cxn ang="0">
+                <a:pos x="connsiteX23" y="connsiteY23"/>
+              </a:cxn>
+              <a:cxn ang="0">
+                <a:pos x="connsiteX24" y="connsiteY24"/>
+              </a:cxn>
+              <a:cxn ang="0">
+                <a:pos x="connsiteX25" y="connsiteY25"/>
+              </a:cxn>
+              <a:cxn ang="0">
+                <a:pos x="connsiteX26" y="connsiteY26"/>
+              </a:cxn>
+              <a:cxn ang="0">
+                <a:pos x="connsiteX27" y="connsiteY27"/>
+              </a:cxn>
+              <a:cxn ang="0">
+                <a:pos x="connsiteX28" y="connsiteY28"/>
+              </a:cxn>
+              <a:cxn ang="0">
+                <a:pos x="connsiteX29" y="connsiteY29"/>
+              </a:cxn>
+              <a:cxn ang="0">
+                <a:pos x="connsiteX30" y="connsiteY30"/>
+              </a:cxn>
+              <a:cxn ang="0">
+                <a:pos x="connsiteX31" y="connsiteY31"/>
+              </a:cxn>
+              <a:cxn ang="0">
+                <a:pos x="connsiteX32" y="connsiteY32"/>
+              </a:cxn>
+              <a:cxn ang="0">
+                <a:pos x="connsiteX33" y="connsiteY33"/>
+              </a:cxn>
+              <a:cxn ang="0">
+                <a:pos x="connsiteX34" y="connsiteY34"/>
+              </a:cxn>
+              <a:cxn ang="0">
+                <a:pos x="connsiteX35" y="connsiteY35"/>
+              </a:cxn>
+            </a:cxnLst>
+            <a:rect l="l" t="t" r="r" b="b"/>
+            <a:pathLst>
+              <a:path w="880947" h="2159575">
+                <a:moveTo>
+                  <a:pt x="880947" y="0"/>
+                </a:moveTo>
+                <a:cubicBezTo>
+                  <a:pt x="679159" y="86481"/>
+                  <a:pt x="876632" y="4407"/>
+                  <a:pt x="769435" y="44605"/>
+                </a:cubicBezTo>
+                <a:cubicBezTo>
+                  <a:pt x="750692" y="51633"/>
+                  <a:pt x="732490" y="60066"/>
+                  <a:pt x="713678" y="66907"/>
+                </a:cubicBezTo>
+                <a:cubicBezTo>
+                  <a:pt x="691585" y="74941"/>
+                  <a:pt x="668471" y="80168"/>
+                  <a:pt x="646771" y="89210"/>
+                </a:cubicBezTo>
+                <a:cubicBezTo>
+                  <a:pt x="623754" y="98800"/>
+                  <a:pt x="602881" y="113073"/>
+                  <a:pt x="579864" y="122663"/>
+                </a:cubicBezTo>
+                <a:cubicBezTo>
+                  <a:pt x="515971" y="149285"/>
+                  <a:pt x="504981" y="146105"/>
+                  <a:pt x="434898" y="156117"/>
+                </a:cubicBezTo>
+                <a:lnTo>
+                  <a:pt x="356839" y="178420"/>
+                </a:lnTo>
+                <a:cubicBezTo>
+                  <a:pt x="345581" y="181798"/>
+                  <a:pt x="333465" y="183524"/>
+                  <a:pt x="323386" y="189571"/>
+                </a:cubicBezTo>
+                <a:cubicBezTo>
+                  <a:pt x="314371" y="194980"/>
+                  <a:pt x="308517" y="204439"/>
+                  <a:pt x="301083" y="211873"/>
+                </a:cubicBezTo>
+                <a:cubicBezTo>
+                  <a:pt x="293649" y="226741"/>
+                  <a:pt x="284618" y="240913"/>
+                  <a:pt x="278781" y="256478"/>
+                </a:cubicBezTo>
+                <a:cubicBezTo>
+                  <a:pt x="273400" y="270828"/>
+                  <a:pt x="274484" y="287375"/>
+                  <a:pt x="267630" y="301083"/>
+                </a:cubicBezTo>
+                <a:cubicBezTo>
+                  <a:pt x="259318" y="317706"/>
+                  <a:pt x="245327" y="330820"/>
+                  <a:pt x="234176" y="345688"/>
+                </a:cubicBezTo>
+                <a:cubicBezTo>
+                  <a:pt x="205554" y="460178"/>
+                  <a:pt x="244456" y="318276"/>
+                  <a:pt x="200722" y="434898"/>
+                </a:cubicBezTo>
+                <a:cubicBezTo>
+                  <a:pt x="176712" y="498922"/>
+                  <a:pt x="205396" y="470158"/>
+                  <a:pt x="167269" y="546410"/>
+                </a:cubicBezTo>
+                <a:lnTo>
+                  <a:pt x="133815" y="613317"/>
+                </a:lnTo>
+                <a:cubicBezTo>
+                  <a:pt x="108780" y="763529"/>
+                  <a:pt x="131736" y="706686"/>
+                  <a:pt x="89210" y="791737"/>
+                </a:cubicBezTo>
+                <a:cubicBezTo>
+                  <a:pt x="85493" y="814039"/>
+                  <a:pt x="82796" y="836536"/>
+                  <a:pt x="78059" y="858644"/>
+                </a:cubicBezTo>
+                <a:cubicBezTo>
+                  <a:pt x="71636" y="888615"/>
+                  <a:pt x="60091" y="917510"/>
+                  <a:pt x="55756" y="947854"/>
+                </a:cubicBezTo>
+                <a:cubicBezTo>
+                  <a:pt x="52039" y="973873"/>
+                  <a:pt x="49760" y="1000139"/>
+                  <a:pt x="44605" y="1025912"/>
+                </a:cubicBezTo>
+                <a:cubicBezTo>
+                  <a:pt x="42300" y="1037438"/>
+                  <a:pt x="36547" y="1048026"/>
+                  <a:pt x="33454" y="1059366"/>
+                </a:cubicBezTo>
+                <a:cubicBezTo>
+                  <a:pt x="25389" y="1088938"/>
+                  <a:pt x="11152" y="1148576"/>
+                  <a:pt x="11152" y="1148576"/>
+                </a:cubicBezTo>
+                <a:cubicBezTo>
+                  <a:pt x="7435" y="1215483"/>
+                  <a:pt x="0" y="1282287"/>
+                  <a:pt x="0" y="1349298"/>
+                </a:cubicBezTo>
+                <a:cubicBezTo>
+                  <a:pt x="0" y="1431779"/>
+                  <a:pt x="10110" y="1446533"/>
+                  <a:pt x="33454" y="1516566"/>
+                </a:cubicBezTo>
+                <a:cubicBezTo>
+                  <a:pt x="37171" y="1527717"/>
+                  <a:pt x="38085" y="1540240"/>
+                  <a:pt x="44605" y="1550020"/>
+                </a:cubicBezTo>
+                <a:lnTo>
+                  <a:pt x="66908" y="1583473"/>
+                </a:lnTo>
+                <a:lnTo>
+                  <a:pt x="89210" y="1650381"/>
+                </a:lnTo>
+                <a:cubicBezTo>
+                  <a:pt x="92927" y="1661532"/>
+                  <a:pt x="93841" y="1674054"/>
+                  <a:pt x="100361" y="1683834"/>
+                </a:cubicBezTo>
+                <a:lnTo>
+                  <a:pt x="122664" y="1717288"/>
+                </a:lnTo>
+                <a:cubicBezTo>
+                  <a:pt x="148291" y="1794169"/>
+                  <a:pt x="128343" y="1767572"/>
+                  <a:pt x="167269" y="1806498"/>
+                </a:cubicBezTo>
+                <a:cubicBezTo>
+                  <a:pt x="169352" y="1814829"/>
+                  <a:pt x="182716" y="1873130"/>
+                  <a:pt x="189571" y="1884556"/>
+                </a:cubicBezTo>
+                <a:cubicBezTo>
+                  <a:pt x="194980" y="1893571"/>
+                  <a:pt x="204440" y="1899425"/>
+                  <a:pt x="211874" y="1906859"/>
+                </a:cubicBezTo>
+                <a:cubicBezTo>
+                  <a:pt x="239903" y="1990947"/>
+                  <a:pt x="202093" y="1887295"/>
+                  <a:pt x="245327" y="1973766"/>
+                </a:cubicBezTo>
+                <a:cubicBezTo>
+                  <a:pt x="272810" y="2028733"/>
+                  <a:pt x="236169" y="1987408"/>
+                  <a:pt x="278781" y="2040673"/>
+                </a:cubicBezTo>
+                <a:cubicBezTo>
+                  <a:pt x="342339" y="2120121"/>
+                  <a:pt x="254740" y="1993464"/>
+                  <a:pt x="323386" y="2096429"/>
+                </a:cubicBezTo>
+                <a:cubicBezTo>
+                  <a:pt x="327103" y="2107580"/>
+                  <a:pt x="324972" y="2123051"/>
+                  <a:pt x="334537" y="2129883"/>
+                </a:cubicBezTo>
+                <a:cubicBezTo>
+                  <a:pt x="390454" y="2169824"/>
+                  <a:pt x="388393" y="2165236"/>
+                  <a:pt x="412595" y="2141034"/>
+                </a:cubicBezTo>
+              </a:path>
+            </a:pathLst>
+          </a:custGeom>
+          <a:ln>
+            <a:solidFill>
+              <a:srgbClr val="FF0000"/>
+            </a:solidFill>
+          </a:ln>
+        </p:spPr>
+        <p:style>
+          <a:lnRef idx="3">
+            <a:schemeClr val="dk1"/>
+          </a:lnRef>
+          <a:fillRef idx="0">
+            <a:schemeClr val="dk1"/>
+          </a:fillRef>
+          <a:effectRef idx="2">
+            <a:schemeClr val="dk1"/>
+          </a:effectRef>
+          <a:fontRef idx="minor">
+            <a:schemeClr val="tx1"/>
+          </a:fontRef>
+        </p:style>
+        <p:txBody>
+          <a:bodyPr rtlCol="0" anchor="ctr"/>
+          <a:lstStyle/>
+          <a:p>
+            <a:pPr algn="ctr"/>
+            <a:endParaRPr lang="en-US"/>
+          </a:p>
+        </p:txBody>
+      </p:sp>
+      <p:sp>
+        <p:nvSpPr>
+          <p:cNvPr id="19" name="Freeform 18">
+            <a:extLst>
+              <a:ext uri="{FF2B5EF4-FFF2-40B4-BE49-F238E27FC236}">
+                <a16:creationId xmlns:a16="http://schemas.microsoft.com/office/drawing/2014/main" id="{11076E7D-6695-4749-9D9A-D2A8CCE2395E}"/>
+              </a:ext>
+            </a:extLst>
+          </p:cNvPr>
+          <p:cNvSpPr/>
+          <p:nvPr/>
+        </p:nvSpPr>
+        <p:spPr>
+          <a:xfrm>
+            <a:off x="5430644" y="4806176"/>
+            <a:ext cx="312234" cy="646770"/>
+          </a:xfrm>
+          <a:custGeom>
+            <a:avLst/>
+            <a:gdLst>
+              <a:gd name="connsiteX0" fmla="*/ 11151 w 312234"/>
+              <a:gd name="connsiteY0" fmla="*/ 0 h 646770"/>
+              <a:gd name="connsiteX1" fmla="*/ 0 w 312234"/>
+              <a:gd name="connsiteY1" fmla="*/ 55756 h 646770"/>
+              <a:gd name="connsiteX2" fmla="*/ 22302 w 312234"/>
+              <a:gd name="connsiteY2" fmla="*/ 133814 h 646770"/>
+              <a:gd name="connsiteX3" fmla="*/ 66907 w 312234"/>
+              <a:gd name="connsiteY3" fmla="*/ 267629 h 646770"/>
+              <a:gd name="connsiteX4" fmla="*/ 78058 w 312234"/>
+              <a:gd name="connsiteY4" fmla="*/ 301083 h 646770"/>
+              <a:gd name="connsiteX5" fmla="*/ 89210 w 312234"/>
+              <a:gd name="connsiteY5" fmla="*/ 345687 h 646770"/>
+              <a:gd name="connsiteX6" fmla="*/ 144966 w 312234"/>
+              <a:gd name="connsiteY6" fmla="*/ 457200 h 646770"/>
+              <a:gd name="connsiteX7" fmla="*/ 200722 w 312234"/>
+              <a:gd name="connsiteY7" fmla="*/ 568712 h 646770"/>
+              <a:gd name="connsiteX8" fmla="*/ 245327 w 312234"/>
+              <a:gd name="connsiteY8" fmla="*/ 635619 h 646770"/>
+              <a:gd name="connsiteX9" fmla="*/ 278780 w 312234"/>
+              <a:gd name="connsiteY9" fmla="*/ 646770 h 646770"/>
+              <a:gd name="connsiteX10" fmla="*/ 301083 w 312234"/>
+              <a:gd name="connsiteY10" fmla="*/ 591014 h 646770"/>
+              <a:gd name="connsiteX11" fmla="*/ 312234 w 312234"/>
+              <a:gd name="connsiteY11" fmla="*/ 591014 h 646770"/>
+            </a:gdLst>
+            <a:ahLst/>
+            <a:cxnLst>
+              <a:cxn ang="0">
+                <a:pos x="connsiteX0" y="connsiteY0"/>
+              </a:cxn>
+              <a:cxn ang="0">
+                <a:pos x="connsiteX1" y="connsiteY1"/>
+              </a:cxn>
+              <a:cxn ang="0">
+                <a:pos x="connsiteX2" y="connsiteY2"/>
+              </a:cxn>
+              <a:cxn ang="0">
+                <a:pos x="connsiteX3" y="connsiteY3"/>
+              </a:cxn>
+              <a:cxn ang="0">
+                <a:pos x="connsiteX4" y="connsiteY4"/>
+              </a:cxn>
+              <a:cxn ang="0">
+                <a:pos x="connsiteX5" y="connsiteY5"/>
+              </a:cxn>
+              <a:cxn ang="0">
+                <a:pos x="connsiteX6" y="connsiteY6"/>
+              </a:cxn>
+              <a:cxn ang="0">
+                <a:pos x="connsiteX7" y="connsiteY7"/>
+              </a:cxn>
+              <a:cxn ang="0">
+                <a:pos x="connsiteX8" y="connsiteY8"/>
+              </a:cxn>
+              <a:cxn ang="0">
+                <a:pos x="connsiteX9" y="connsiteY9"/>
+              </a:cxn>
+              <a:cxn ang="0">
+                <a:pos x="connsiteX10" y="connsiteY10"/>
+              </a:cxn>
+              <a:cxn ang="0">
+                <a:pos x="connsiteX11" y="connsiteY11"/>
+              </a:cxn>
+            </a:cxnLst>
+            <a:rect l="l" t="t" r="r" b="b"/>
+            <a:pathLst>
+              <a:path w="312234" h="646770">
+                <a:moveTo>
+                  <a:pt x="11151" y="0"/>
+                </a:moveTo>
+                <a:cubicBezTo>
+                  <a:pt x="7434" y="18585"/>
+                  <a:pt x="0" y="36803"/>
+                  <a:pt x="0" y="55756"/>
+                </a:cubicBezTo>
+                <a:cubicBezTo>
+                  <a:pt x="0" y="74330"/>
+                  <a:pt x="17043" y="114532"/>
+                  <a:pt x="22302" y="133814"/>
+                </a:cubicBezTo>
+                <a:cubicBezTo>
+                  <a:pt x="71822" y="315385"/>
+                  <a:pt x="18323" y="154264"/>
+                  <a:pt x="66907" y="267629"/>
+                </a:cubicBezTo>
+                <a:cubicBezTo>
+                  <a:pt x="71537" y="278433"/>
+                  <a:pt x="74829" y="289781"/>
+                  <a:pt x="78058" y="301083"/>
+                </a:cubicBezTo>
+                <a:cubicBezTo>
+                  <a:pt x="82268" y="315819"/>
+                  <a:pt x="83173" y="331601"/>
+                  <a:pt x="89210" y="345687"/>
+                </a:cubicBezTo>
+                <a:cubicBezTo>
+                  <a:pt x="105581" y="383885"/>
+                  <a:pt x="134887" y="416882"/>
+                  <a:pt x="144966" y="457200"/>
+                </a:cubicBezTo>
+                <a:cubicBezTo>
+                  <a:pt x="162618" y="527808"/>
+                  <a:pt x="147616" y="489053"/>
+                  <a:pt x="200722" y="568712"/>
+                </a:cubicBezTo>
+                <a:cubicBezTo>
+                  <a:pt x="200723" y="568713"/>
+                  <a:pt x="245326" y="635619"/>
+                  <a:pt x="245327" y="635619"/>
+                </a:cubicBezTo>
+                <a:lnTo>
+                  <a:pt x="278780" y="646770"/>
+                </a:lnTo>
+                <a:cubicBezTo>
+                  <a:pt x="266005" y="595669"/>
+                  <a:pt x="252149" y="603247"/>
+                  <a:pt x="301083" y="591014"/>
+                </a:cubicBezTo>
+                <a:cubicBezTo>
+                  <a:pt x="304689" y="590113"/>
+                  <a:pt x="308517" y="591014"/>
+                  <a:pt x="312234" y="591014"/>
+                </a:cubicBezTo>
+              </a:path>
+            </a:pathLst>
+          </a:custGeom>
+          <a:ln>
+            <a:solidFill>
+              <a:srgbClr val="00B050"/>
+            </a:solidFill>
+          </a:ln>
+        </p:spPr>
+        <p:style>
+          <a:lnRef idx="3">
+            <a:schemeClr val="dk1"/>
+          </a:lnRef>
+          <a:fillRef idx="0">
+            <a:schemeClr val="dk1"/>
+          </a:fillRef>
+          <a:effectRef idx="2">
+            <a:schemeClr val="dk1"/>
+          </a:effectRef>
+          <a:fontRef idx="minor">
+            <a:schemeClr val="tx1"/>
+          </a:fontRef>
+        </p:style>
+        <p:txBody>
+          <a:bodyPr rtlCol="0" anchor="ctr"/>
+          <a:lstStyle/>
+          <a:p>
+            <a:pPr algn="ctr"/>
+            <a:endParaRPr lang="en-US"/>
+          </a:p>
+        </p:txBody>
+      </p:sp>
+      <p:sp>
+        <p:nvSpPr>
+          <p:cNvPr id="20" name="Freeform 19">
+            <a:extLst>
+              <a:ext uri="{FF2B5EF4-FFF2-40B4-BE49-F238E27FC236}">
+                <a16:creationId xmlns:a16="http://schemas.microsoft.com/office/drawing/2014/main" id="{E9E83DD7-C001-F94C-930C-664604EC1E74}"/>
+              </a:ext>
+            </a:extLst>
+          </p:cNvPr>
+          <p:cNvSpPr/>
+          <p:nvPr/>
+        </p:nvSpPr>
+        <p:spPr>
+          <a:xfrm>
+            <a:off x="5564459" y="3200400"/>
+            <a:ext cx="669073" cy="45751"/>
+          </a:xfrm>
+          <a:custGeom>
+            <a:avLst/>
+            <a:gdLst>
+              <a:gd name="connsiteX0" fmla="*/ 0 w 669073"/>
+              <a:gd name="connsiteY0" fmla="*/ 0 h 45751"/>
+              <a:gd name="connsiteX1" fmla="*/ 535258 w 669073"/>
+              <a:gd name="connsiteY1" fmla="*/ 33454 h 45751"/>
+              <a:gd name="connsiteX2" fmla="*/ 624468 w 669073"/>
+              <a:gd name="connsiteY2" fmla="*/ 11151 h 45751"/>
+              <a:gd name="connsiteX3" fmla="*/ 669073 w 669073"/>
+              <a:gd name="connsiteY3" fmla="*/ 11151 h 45751"/>
+            </a:gdLst>
+            <a:ahLst/>
+            <a:cxnLst>
+              <a:cxn ang="0">
+                <a:pos x="connsiteX0" y="connsiteY0"/>
+              </a:cxn>
+              <a:cxn ang="0">
+                <a:pos x="connsiteX1" y="connsiteY1"/>
+              </a:cxn>
+              <a:cxn ang="0">
+                <a:pos x="connsiteX2" y="connsiteY2"/>
+              </a:cxn>
+              <a:cxn ang="0">
+                <a:pos x="connsiteX3" y="connsiteY3"/>
+              </a:cxn>
+            </a:cxnLst>
+            <a:rect l="l" t="t" r="r" b="b"/>
+            <a:pathLst>
+              <a:path w="669073" h="45751">
+                <a:moveTo>
+                  <a:pt x="0" y="0"/>
+                </a:moveTo>
+                <a:cubicBezTo>
+                  <a:pt x="205874" y="68624"/>
+                  <a:pt x="104392" y="42071"/>
+                  <a:pt x="535258" y="33454"/>
+                </a:cubicBezTo>
+                <a:cubicBezTo>
+                  <a:pt x="565904" y="32841"/>
+                  <a:pt x="594731" y="18585"/>
+                  <a:pt x="624468" y="11151"/>
+                </a:cubicBezTo>
+                <a:cubicBezTo>
+                  <a:pt x="638892" y="7545"/>
+                  <a:pt x="654205" y="11151"/>
+                  <a:pt x="669073" y="11151"/>
+                </a:cubicBezTo>
+              </a:path>
+            </a:pathLst>
+          </a:custGeom>
+          <a:ln>
+            <a:solidFill>
+              <a:srgbClr val="00B050"/>
+            </a:solidFill>
+          </a:ln>
+        </p:spPr>
+        <p:style>
+          <a:lnRef idx="3">
+            <a:schemeClr val="accent6"/>
+          </a:lnRef>
+          <a:fillRef idx="0">
+            <a:schemeClr val="accent6"/>
+          </a:fillRef>
+          <a:effectRef idx="2">
+            <a:schemeClr val="accent6"/>
+          </a:effectRef>
+          <a:fontRef idx="minor">
+            <a:schemeClr val="tx1"/>
+          </a:fontRef>
+        </p:style>
+        <p:txBody>
+          <a:bodyPr rtlCol="0" anchor="ctr"/>
+          <a:lstStyle/>
+          <a:p>
+            <a:pPr algn="ctr"/>
+            <a:endParaRPr lang="en-US"/>
+          </a:p>
+        </p:txBody>
+      </p:sp>
+      <p:sp>
+        <p:nvSpPr>
+          <p:cNvPr id="21" name="Freeform 20">
+            <a:extLst>
+              <a:ext uri="{FF2B5EF4-FFF2-40B4-BE49-F238E27FC236}">
+                <a16:creationId xmlns:a16="http://schemas.microsoft.com/office/drawing/2014/main" id="{48591804-72BA-AB41-84AB-9615BD989FF9}"/>
+              </a:ext>
+            </a:extLst>
+          </p:cNvPr>
+          <p:cNvSpPr/>
+          <p:nvPr/>
+        </p:nvSpPr>
+        <p:spPr>
+          <a:xfrm>
+            <a:off x="5854390" y="2665141"/>
+            <a:ext cx="347340" cy="278781"/>
+          </a:xfrm>
+          <a:custGeom>
+            <a:avLst/>
+            <a:gdLst>
+              <a:gd name="connsiteX0" fmla="*/ 0 w 347340"/>
+              <a:gd name="connsiteY0" fmla="*/ 278781 h 278781"/>
+              <a:gd name="connsiteX1" fmla="*/ 33454 w 347340"/>
+              <a:gd name="connsiteY1" fmla="*/ 211874 h 278781"/>
+              <a:gd name="connsiteX2" fmla="*/ 89210 w 347340"/>
+              <a:gd name="connsiteY2" fmla="*/ 156118 h 278781"/>
+              <a:gd name="connsiteX3" fmla="*/ 122664 w 347340"/>
+              <a:gd name="connsiteY3" fmla="*/ 111513 h 278781"/>
+              <a:gd name="connsiteX4" fmla="*/ 167269 w 347340"/>
+              <a:gd name="connsiteY4" fmla="*/ 66908 h 278781"/>
+              <a:gd name="connsiteX5" fmla="*/ 234176 w 347340"/>
+              <a:gd name="connsiteY5" fmla="*/ 44605 h 278781"/>
+              <a:gd name="connsiteX6" fmla="*/ 267630 w 347340"/>
+              <a:gd name="connsiteY6" fmla="*/ 33454 h 278781"/>
+              <a:gd name="connsiteX7" fmla="*/ 345688 w 347340"/>
+              <a:gd name="connsiteY7" fmla="*/ 0 h 278781"/>
+              <a:gd name="connsiteX8" fmla="*/ 345688 w 347340"/>
+              <a:gd name="connsiteY8" fmla="*/ 11152 h 278781"/>
+            </a:gdLst>
+            <a:ahLst/>
+            <a:cxnLst>
+              <a:cxn ang="0">
+                <a:pos x="connsiteX0" y="connsiteY0"/>
+              </a:cxn>
+              <a:cxn ang="0">
+                <a:pos x="connsiteX1" y="connsiteY1"/>
+              </a:cxn>
+              <a:cxn ang="0">
+                <a:pos x="connsiteX2" y="connsiteY2"/>
+              </a:cxn>
+              <a:cxn ang="0">
+                <a:pos x="connsiteX3" y="connsiteY3"/>
+              </a:cxn>
+              <a:cxn ang="0">
+                <a:pos x="connsiteX4" y="connsiteY4"/>
+              </a:cxn>
+              <a:cxn ang="0">
+                <a:pos x="connsiteX5" y="connsiteY5"/>
+              </a:cxn>
+              <a:cxn ang="0">
+                <a:pos x="connsiteX6" y="connsiteY6"/>
+              </a:cxn>
+              <a:cxn ang="0">
+                <a:pos x="connsiteX7" y="connsiteY7"/>
+              </a:cxn>
+              <a:cxn ang="0">
+                <a:pos x="connsiteX8" y="connsiteY8"/>
+              </a:cxn>
+            </a:cxnLst>
+            <a:rect l="l" t="t" r="r" b="b"/>
+            <a:pathLst>
+              <a:path w="347340" h="278781">
+                <a:moveTo>
+                  <a:pt x="0" y="278781"/>
+                </a:moveTo>
+                <a:cubicBezTo>
+                  <a:pt x="11151" y="256479"/>
+                  <a:pt x="18788" y="232040"/>
+                  <a:pt x="33454" y="211874"/>
+                </a:cubicBezTo>
+                <a:cubicBezTo>
+                  <a:pt x="48913" y="190618"/>
+                  <a:pt x="73440" y="177145"/>
+                  <a:pt x="89210" y="156118"/>
+                </a:cubicBezTo>
+                <a:cubicBezTo>
+                  <a:pt x="100361" y="141250"/>
+                  <a:pt x="110425" y="125500"/>
+                  <a:pt x="122664" y="111513"/>
+                </a:cubicBezTo>
+                <a:cubicBezTo>
+                  <a:pt x="136510" y="95689"/>
+                  <a:pt x="147321" y="73557"/>
+                  <a:pt x="167269" y="66908"/>
+                </a:cubicBezTo>
+                <a:lnTo>
+                  <a:pt x="234176" y="44605"/>
+                </a:lnTo>
+                <a:lnTo>
+                  <a:pt x="267630" y="33454"/>
+                </a:lnTo>
+                <a:cubicBezTo>
+                  <a:pt x="294943" y="15245"/>
+                  <a:pt x="309685" y="0"/>
+                  <a:pt x="345688" y="0"/>
+                </a:cubicBezTo>
+                <a:cubicBezTo>
+                  <a:pt x="349405" y="0"/>
+                  <a:pt x="345688" y="7435"/>
+                  <a:pt x="345688" y="11152"/>
+                </a:cubicBezTo>
+              </a:path>
+            </a:pathLst>
+          </a:custGeom>
+          <a:ln>
+            <a:solidFill>
+              <a:srgbClr val="00B050"/>
+            </a:solidFill>
+          </a:ln>
+        </p:spPr>
+        <p:style>
+          <a:lnRef idx="3">
+            <a:schemeClr val="dk1"/>
+          </a:lnRef>
+          <a:fillRef idx="0">
+            <a:schemeClr val="dk1"/>
+          </a:fillRef>
+          <a:effectRef idx="2">
+            <a:schemeClr val="dk1"/>
+          </a:effectRef>
+          <a:fontRef idx="minor">
+            <a:schemeClr val="tx1"/>
+          </a:fontRef>
+        </p:style>
+        <p:txBody>
+          <a:bodyPr rtlCol="0" anchor="ctr"/>
+          <a:lstStyle/>
+          <a:p>
+            <a:pPr algn="ctr"/>
+            <a:endParaRPr lang="en-US"/>
+          </a:p>
+        </p:txBody>
+      </p:sp>
+      <p:sp>
+        <p:nvSpPr>
+          <p:cNvPr id="22" name="Freeform 21">
+            <a:extLst>
+              <a:ext uri="{FF2B5EF4-FFF2-40B4-BE49-F238E27FC236}">
+                <a16:creationId xmlns:a16="http://schemas.microsoft.com/office/drawing/2014/main" id="{1688F7D3-2318-6743-B9D0-6742C68ACFE9}"/>
+              </a:ext>
+            </a:extLst>
+          </p:cNvPr>
+          <p:cNvSpPr/>
+          <p:nvPr/>
+        </p:nvSpPr>
+        <p:spPr>
+          <a:xfrm>
+            <a:off x="4984019" y="3490332"/>
+            <a:ext cx="1271815" cy="2486744"/>
+          </a:xfrm>
+          <a:custGeom>
+            <a:avLst/>
+            <a:gdLst>
+              <a:gd name="connsiteX0" fmla="*/ 1271815 w 1271815"/>
+              <a:gd name="connsiteY0" fmla="*/ 0 h 2486744"/>
+              <a:gd name="connsiteX1" fmla="*/ 1160303 w 1271815"/>
+              <a:gd name="connsiteY1" fmla="*/ 22302 h 2486744"/>
+              <a:gd name="connsiteX2" fmla="*/ 1037640 w 1271815"/>
+              <a:gd name="connsiteY2" fmla="*/ 78058 h 2486744"/>
+              <a:gd name="connsiteX3" fmla="*/ 981883 w 1271815"/>
+              <a:gd name="connsiteY3" fmla="*/ 100361 h 2486744"/>
+              <a:gd name="connsiteX4" fmla="*/ 848069 w 1271815"/>
+              <a:gd name="connsiteY4" fmla="*/ 156117 h 2486744"/>
+              <a:gd name="connsiteX5" fmla="*/ 758859 w 1271815"/>
+              <a:gd name="connsiteY5" fmla="*/ 223024 h 2486744"/>
+              <a:gd name="connsiteX6" fmla="*/ 714254 w 1271815"/>
+              <a:gd name="connsiteY6" fmla="*/ 256478 h 2486744"/>
+              <a:gd name="connsiteX7" fmla="*/ 647347 w 1271815"/>
+              <a:gd name="connsiteY7" fmla="*/ 356839 h 2486744"/>
+              <a:gd name="connsiteX8" fmla="*/ 625044 w 1271815"/>
+              <a:gd name="connsiteY8" fmla="*/ 412595 h 2486744"/>
+              <a:gd name="connsiteX9" fmla="*/ 546986 w 1271815"/>
+              <a:gd name="connsiteY9" fmla="*/ 512956 h 2486744"/>
+              <a:gd name="connsiteX10" fmla="*/ 524683 w 1271815"/>
+              <a:gd name="connsiteY10" fmla="*/ 557561 h 2486744"/>
+              <a:gd name="connsiteX11" fmla="*/ 446625 w 1271815"/>
+              <a:gd name="connsiteY11" fmla="*/ 657922 h 2486744"/>
+              <a:gd name="connsiteX12" fmla="*/ 368566 w 1271815"/>
+              <a:gd name="connsiteY12" fmla="*/ 758283 h 2486744"/>
+              <a:gd name="connsiteX13" fmla="*/ 335113 w 1271815"/>
+              <a:gd name="connsiteY13" fmla="*/ 825190 h 2486744"/>
+              <a:gd name="connsiteX14" fmla="*/ 257054 w 1271815"/>
+              <a:gd name="connsiteY14" fmla="*/ 925551 h 2486744"/>
+              <a:gd name="connsiteX15" fmla="*/ 234752 w 1271815"/>
+              <a:gd name="connsiteY15" fmla="*/ 970156 h 2486744"/>
+              <a:gd name="connsiteX16" fmla="*/ 190147 w 1271815"/>
+              <a:gd name="connsiteY16" fmla="*/ 1037063 h 2486744"/>
+              <a:gd name="connsiteX17" fmla="*/ 167844 w 1271815"/>
+              <a:gd name="connsiteY17" fmla="*/ 1070517 h 2486744"/>
+              <a:gd name="connsiteX18" fmla="*/ 156693 w 1271815"/>
+              <a:gd name="connsiteY18" fmla="*/ 1137424 h 2486744"/>
+              <a:gd name="connsiteX19" fmla="*/ 134391 w 1271815"/>
+              <a:gd name="connsiteY19" fmla="*/ 1159727 h 2486744"/>
+              <a:gd name="connsiteX20" fmla="*/ 112088 w 1271815"/>
+              <a:gd name="connsiteY20" fmla="*/ 1226634 h 2486744"/>
+              <a:gd name="connsiteX21" fmla="*/ 100937 w 1271815"/>
+              <a:gd name="connsiteY21" fmla="*/ 1260088 h 2486744"/>
+              <a:gd name="connsiteX22" fmla="*/ 89786 w 1271815"/>
+              <a:gd name="connsiteY22" fmla="*/ 1304692 h 2486744"/>
+              <a:gd name="connsiteX23" fmla="*/ 56332 w 1271815"/>
+              <a:gd name="connsiteY23" fmla="*/ 1349297 h 2486744"/>
+              <a:gd name="connsiteX24" fmla="*/ 45181 w 1271815"/>
+              <a:gd name="connsiteY24" fmla="*/ 1405053 h 2486744"/>
+              <a:gd name="connsiteX25" fmla="*/ 34030 w 1271815"/>
+              <a:gd name="connsiteY25" fmla="*/ 1449658 h 2486744"/>
+              <a:gd name="connsiteX26" fmla="*/ 11727 w 1271815"/>
+              <a:gd name="connsiteY26" fmla="*/ 1561170 h 2486744"/>
+              <a:gd name="connsiteX27" fmla="*/ 11727 w 1271815"/>
+              <a:gd name="connsiteY27" fmla="*/ 2062975 h 2486744"/>
+              <a:gd name="connsiteX28" fmla="*/ 45181 w 1271815"/>
+              <a:gd name="connsiteY28" fmla="*/ 2129883 h 2486744"/>
+              <a:gd name="connsiteX29" fmla="*/ 67483 w 1271815"/>
+              <a:gd name="connsiteY29" fmla="*/ 2196790 h 2486744"/>
+              <a:gd name="connsiteX30" fmla="*/ 89786 w 1271815"/>
+              <a:gd name="connsiteY30" fmla="*/ 2230244 h 2486744"/>
+              <a:gd name="connsiteX31" fmla="*/ 167844 w 1271815"/>
+              <a:gd name="connsiteY31" fmla="*/ 2297151 h 2486744"/>
+              <a:gd name="connsiteX32" fmla="*/ 201298 w 1271815"/>
+              <a:gd name="connsiteY32" fmla="*/ 2319453 h 2486744"/>
+              <a:gd name="connsiteX33" fmla="*/ 234752 w 1271815"/>
+              <a:gd name="connsiteY33" fmla="*/ 2330605 h 2486744"/>
+              <a:gd name="connsiteX34" fmla="*/ 268205 w 1271815"/>
+              <a:gd name="connsiteY34" fmla="*/ 2352907 h 2486744"/>
+              <a:gd name="connsiteX35" fmla="*/ 335113 w 1271815"/>
+              <a:gd name="connsiteY35" fmla="*/ 2375209 h 2486744"/>
+              <a:gd name="connsiteX36" fmla="*/ 435474 w 1271815"/>
+              <a:gd name="connsiteY36" fmla="*/ 2341756 h 2486744"/>
+              <a:gd name="connsiteX37" fmla="*/ 468927 w 1271815"/>
+              <a:gd name="connsiteY37" fmla="*/ 2330605 h 2486744"/>
+              <a:gd name="connsiteX38" fmla="*/ 513532 w 1271815"/>
+              <a:gd name="connsiteY38" fmla="*/ 2319453 h 2486744"/>
+              <a:gd name="connsiteX39" fmla="*/ 546986 w 1271815"/>
+              <a:gd name="connsiteY39" fmla="*/ 2308302 h 2486744"/>
+              <a:gd name="connsiteX40" fmla="*/ 625044 w 1271815"/>
+              <a:gd name="connsiteY40" fmla="*/ 2297151 h 2486744"/>
+              <a:gd name="connsiteX41" fmla="*/ 647347 w 1271815"/>
+              <a:gd name="connsiteY41" fmla="*/ 2274848 h 2486744"/>
+              <a:gd name="connsiteX42" fmla="*/ 580440 w 1271815"/>
+              <a:gd name="connsiteY42" fmla="*/ 2308302 h 2486744"/>
+              <a:gd name="connsiteX43" fmla="*/ 513532 w 1271815"/>
+              <a:gd name="connsiteY43" fmla="*/ 2330605 h 2486744"/>
+              <a:gd name="connsiteX44" fmla="*/ 480079 w 1271815"/>
+              <a:gd name="connsiteY44" fmla="*/ 2341756 h 2486744"/>
+              <a:gd name="connsiteX45" fmla="*/ 446625 w 1271815"/>
+              <a:gd name="connsiteY45" fmla="*/ 2364058 h 2486744"/>
+              <a:gd name="connsiteX46" fmla="*/ 413171 w 1271815"/>
+              <a:gd name="connsiteY46" fmla="*/ 2375209 h 2486744"/>
+              <a:gd name="connsiteX47" fmla="*/ 513532 w 1271815"/>
+              <a:gd name="connsiteY47" fmla="*/ 2352907 h 2486744"/>
+              <a:gd name="connsiteX48" fmla="*/ 580440 w 1271815"/>
+              <a:gd name="connsiteY48" fmla="*/ 2341756 h 2486744"/>
+              <a:gd name="connsiteX49" fmla="*/ 602742 w 1271815"/>
+              <a:gd name="connsiteY49" fmla="*/ 2319453 h 2486744"/>
+              <a:gd name="connsiteX50" fmla="*/ 669649 w 1271815"/>
+              <a:gd name="connsiteY50" fmla="*/ 2297151 h 2486744"/>
+              <a:gd name="connsiteX51" fmla="*/ 625044 w 1271815"/>
+              <a:gd name="connsiteY51" fmla="*/ 2297151 h 2486744"/>
+              <a:gd name="connsiteX52" fmla="*/ 558137 w 1271815"/>
+              <a:gd name="connsiteY52" fmla="*/ 2319453 h 2486744"/>
+              <a:gd name="connsiteX53" fmla="*/ 524683 w 1271815"/>
+              <a:gd name="connsiteY53" fmla="*/ 2330605 h 2486744"/>
+              <a:gd name="connsiteX54" fmla="*/ 491230 w 1271815"/>
+              <a:gd name="connsiteY54" fmla="*/ 2352907 h 2486744"/>
+              <a:gd name="connsiteX55" fmla="*/ 424322 w 1271815"/>
+              <a:gd name="connsiteY55" fmla="*/ 2375209 h 2486744"/>
+              <a:gd name="connsiteX56" fmla="*/ 402020 w 1271815"/>
+              <a:gd name="connsiteY56" fmla="*/ 2397512 h 2486744"/>
+              <a:gd name="connsiteX57" fmla="*/ 435474 w 1271815"/>
+              <a:gd name="connsiteY57" fmla="*/ 2408663 h 2486744"/>
+              <a:gd name="connsiteX58" fmla="*/ 524683 w 1271815"/>
+              <a:gd name="connsiteY58" fmla="*/ 2430966 h 2486744"/>
+              <a:gd name="connsiteX59" fmla="*/ 636196 w 1271815"/>
+              <a:gd name="connsiteY59" fmla="*/ 2464419 h 2486744"/>
+              <a:gd name="connsiteX60" fmla="*/ 669649 w 1271815"/>
+              <a:gd name="connsiteY60" fmla="*/ 2475570 h 2486744"/>
+              <a:gd name="connsiteX61" fmla="*/ 770010 w 1271815"/>
+              <a:gd name="connsiteY61" fmla="*/ 2486722 h 2486744"/>
+            </a:gdLst>
+            <a:ahLst/>
+            <a:cxnLst>
+              <a:cxn ang="0">
+                <a:pos x="connsiteX0" y="connsiteY0"/>
+              </a:cxn>
+              <a:cxn ang="0">
+                <a:pos x="connsiteX1" y="connsiteY1"/>
+              </a:cxn>
+              <a:cxn ang="0">
+                <a:pos x="connsiteX2" y="connsiteY2"/>
+              </a:cxn>
+              <a:cxn ang="0">
+                <a:pos x="connsiteX3" y="connsiteY3"/>
+              </a:cxn>
+              <a:cxn ang="0">
+                <a:pos x="connsiteX4" y="connsiteY4"/>
+              </a:cxn>
+              <a:cxn ang="0">
+                <a:pos x="connsiteX5" y="connsiteY5"/>
+              </a:cxn>
+              <a:cxn ang="0">
+                <a:pos x="connsiteX6" y="connsiteY6"/>
+              </a:cxn>
+              <a:cxn ang="0">
+                <a:pos x="connsiteX7" y="connsiteY7"/>
+              </a:cxn>
+              <a:cxn ang="0">
+                <a:pos x="connsiteX8" y="connsiteY8"/>
+              </a:cxn>
+              <a:cxn ang="0">
+                <a:pos x="connsiteX9" y="connsiteY9"/>
+              </a:cxn>
+              <a:cxn ang="0">
+                <a:pos x="connsiteX10" y="connsiteY10"/>
+              </a:cxn>
+              <a:cxn ang="0">
+                <a:pos x="connsiteX11" y="connsiteY11"/>
+              </a:cxn>
+              <a:cxn ang="0">
+                <a:pos x="connsiteX12" y="connsiteY12"/>
+              </a:cxn>
+              <a:cxn ang="0">
+                <a:pos x="connsiteX13" y="connsiteY13"/>
+              </a:cxn>
+              <a:cxn ang="0">
+                <a:pos x="connsiteX14" y="connsiteY14"/>
+              </a:cxn>
+              <a:cxn ang="0">
+                <a:pos x="connsiteX15" y="connsiteY15"/>
+              </a:cxn>
+              <a:cxn ang="0">
+                <a:pos x="connsiteX16" y="connsiteY16"/>
+              </a:cxn>
+              <a:cxn ang="0">
+                <a:pos x="connsiteX17" y="connsiteY17"/>
+              </a:cxn>
+              <a:cxn ang="0">
+                <a:pos x="connsiteX18" y="connsiteY18"/>
+              </a:cxn>
+              <a:cxn ang="0">
+                <a:pos x="connsiteX19" y="connsiteY19"/>
+              </a:cxn>
+              <a:cxn ang="0">
+                <a:pos x="connsiteX20" y="connsiteY20"/>
+              </a:cxn>
+              <a:cxn ang="0">
+                <a:pos x="connsiteX21" y="connsiteY21"/>
+              </a:cxn>
+              <a:cxn ang="0">
+                <a:pos x="connsiteX22" y="connsiteY22"/>
+              </a:cxn>
+              <a:cxn ang="0">
+                <a:pos x="connsiteX23" y="connsiteY23"/>
+              </a:cxn>
+              <a:cxn ang="0">
+                <a:pos x="connsiteX24" y="connsiteY24"/>
+              </a:cxn>
+              <a:cxn ang="0">
+                <a:pos x="connsiteX25" y="connsiteY25"/>
+              </a:cxn>
+              <a:cxn ang="0">
+                <a:pos x="connsiteX26" y="connsiteY26"/>
+              </a:cxn>
+              <a:cxn ang="0">
+                <a:pos x="connsiteX27" y="connsiteY27"/>
+              </a:cxn>
+              <a:cxn ang="0">
+                <a:pos x="connsiteX28" y="connsiteY28"/>
+              </a:cxn>
+              <a:cxn ang="0">
+                <a:pos x="connsiteX29" y="connsiteY29"/>
+              </a:cxn>
+              <a:cxn ang="0">
+                <a:pos x="connsiteX30" y="connsiteY30"/>
+              </a:cxn>
+              <a:cxn ang="0">
+                <a:pos x="connsiteX31" y="connsiteY31"/>
+              </a:cxn>
+              <a:cxn ang="0">
+                <a:pos x="connsiteX32" y="connsiteY32"/>
+              </a:cxn>
+              <a:cxn ang="0">
+                <a:pos x="connsiteX33" y="connsiteY33"/>
+              </a:cxn>
+              <a:cxn ang="0">
+                <a:pos x="connsiteX34" y="connsiteY34"/>
+              </a:cxn>
+              <a:cxn ang="0">
+                <a:pos x="connsiteX35" y="connsiteY35"/>
+              </a:cxn>
+              <a:cxn ang="0">
+                <a:pos x="connsiteX36" y="connsiteY36"/>
+              </a:cxn>
+              <a:cxn ang="0">
+                <a:pos x="connsiteX37" y="connsiteY37"/>
+              </a:cxn>
+              <a:cxn ang="0">
+                <a:pos x="connsiteX38" y="connsiteY38"/>
+              </a:cxn>
+              <a:cxn ang="0">
+                <a:pos x="connsiteX39" y="connsiteY39"/>
+              </a:cxn>
+              <a:cxn ang="0">
+                <a:pos x="connsiteX40" y="connsiteY40"/>
+              </a:cxn>
+              <a:cxn ang="0">
+                <a:pos x="connsiteX41" y="connsiteY41"/>
+              </a:cxn>
+              <a:cxn ang="0">
+                <a:pos x="connsiteX42" y="connsiteY42"/>
+              </a:cxn>
+              <a:cxn ang="0">
+                <a:pos x="connsiteX43" y="connsiteY43"/>
+              </a:cxn>
+              <a:cxn ang="0">
+                <a:pos x="connsiteX44" y="connsiteY44"/>
+              </a:cxn>
+              <a:cxn ang="0">
+                <a:pos x="connsiteX45" y="connsiteY45"/>
+              </a:cxn>
+              <a:cxn ang="0">
+                <a:pos x="connsiteX46" y="connsiteY46"/>
+              </a:cxn>
+              <a:cxn ang="0">
+                <a:pos x="connsiteX47" y="connsiteY47"/>
+              </a:cxn>
+              <a:cxn ang="0">
+                <a:pos x="connsiteX48" y="connsiteY48"/>
+              </a:cxn>
+              <a:cxn ang="0">
+                <a:pos x="connsiteX49" y="connsiteY49"/>
+              </a:cxn>
+              <a:cxn ang="0">
+                <a:pos x="connsiteX50" y="connsiteY50"/>
+              </a:cxn>
+              <a:cxn ang="0">
+                <a:pos x="connsiteX51" y="connsiteY51"/>
+              </a:cxn>
+              <a:cxn ang="0">
+                <a:pos x="connsiteX52" y="connsiteY52"/>
+              </a:cxn>
+              <a:cxn ang="0">
+                <a:pos x="connsiteX53" y="connsiteY53"/>
+              </a:cxn>
+              <a:cxn ang="0">
+                <a:pos x="connsiteX54" y="connsiteY54"/>
+              </a:cxn>
+              <a:cxn ang="0">
+                <a:pos x="connsiteX55" y="connsiteY55"/>
+              </a:cxn>
+              <a:cxn ang="0">
+                <a:pos x="connsiteX56" y="connsiteY56"/>
+              </a:cxn>
+              <a:cxn ang="0">
+                <a:pos x="connsiteX57" y="connsiteY57"/>
+              </a:cxn>
+              <a:cxn ang="0">
+                <a:pos x="connsiteX58" y="connsiteY58"/>
+              </a:cxn>
+              <a:cxn ang="0">
+                <a:pos x="connsiteX59" y="connsiteY59"/>
+              </a:cxn>
+              <a:cxn ang="0">
+                <a:pos x="connsiteX60" y="connsiteY60"/>
+              </a:cxn>
+              <a:cxn ang="0">
+                <a:pos x="connsiteX61" y="connsiteY61"/>
+              </a:cxn>
+            </a:cxnLst>
+            <a:rect l="l" t="t" r="r" b="b"/>
+            <a:pathLst>
+              <a:path w="1271815" h="2486744">
+                <a:moveTo>
+                  <a:pt x="1271815" y="0"/>
+                </a:moveTo>
+                <a:cubicBezTo>
+                  <a:pt x="1234644" y="7434"/>
+                  <a:pt x="1196930" y="12535"/>
+                  <a:pt x="1160303" y="22302"/>
+                </a:cubicBezTo>
+                <a:cubicBezTo>
+                  <a:pt x="1120929" y="32802"/>
+                  <a:pt x="1073206" y="61892"/>
+                  <a:pt x="1037640" y="78058"/>
+                </a:cubicBezTo>
+                <a:cubicBezTo>
+                  <a:pt x="1019417" y="86341"/>
+                  <a:pt x="1000106" y="92078"/>
+                  <a:pt x="981883" y="100361"/>
+                </a:cubicBezTo>
+                <a:cubicBezTo>
+                  <a:pt x="860974" y="155319"/>
+                  <a:pt x="969721" y="115565"/>
+                  <a:pt x="848069" y="156117"/>
+                </a:cubicBezTo>
+                <a:lnTo>
+                  <a:pt x="758859" y="223024"/>
+                </a:lnTo>
+                <a:cubicBezTo>
+                  <a:pt x="743991" y="234175"/>
+                  <a:pt x="725405" y="241610"/>
+                  <a:pt x="714254" y="256478"/>
+                </a:cubicBezTo>
+                <a:cubicBezTo>
+                  <a:pt x="686241" y="293830"/>
+                  <a:pt x="668854" y="313826"/>
+                  <a:pt x="647347" y="356839"/>
+                </a:cubicBezTo>
+                <a:cubicBezTo>
+                  <a:pt x="638395" y="374743"/>
+                  <a:pt x="635868" y="395757"/>
+                  <a:pt x="625044" y="412595"/>
+                </a:cubicBezTo>
+                <a:cubicBezTo>
+                  <a:pt x="602126" y="448245"/>
+                  <a:pt x="565940" y="475049"/>
+                  <a:pt x="546986" y="512956"/>
+                </a:cubicBezTo>
+                <a:cubicBezTo>
+                  <a:pt x="539552" y="527824"/>
+                  <a:pt x="534145" y="543893"/>
+                  <a:pt x="524683" y="557561"/>
+                </a:cubicBezTo>
+                <a:cubicBezTo>
+                  <a:pt x="500559" y="592406"/>
+                  <a:pt x="468430" y="621581"/>
+                  <a:pt x="446625" y="657922"/>
+                </a:cubicBezTo>
+                <a:cubicBezTo>
+                  <a:pt x="402353" y="731708"/>
+                  <a:pt x="428497" y="698352"/>
+                  <a:pt x="368566" y="758283"/>
+                </a:cubicBezTo>
+                <a:cubicBezTo>
+                  <a:pt x="357415" y="780585"/>
+                  <a:pt x="348944" y="804443"/>
+                  <a:pt x="335113" y="825190"/>
+                </a:cubicBezTo>
+                <a:cubicBezTo>
+                  <a:pt x="311604" y="860453"/>
+                  <a:pt x="276007" y="887644"/>
+                  <a:pt x="257054" y="925551"/>
+                </a:cubicBezTo>
+                <a:cubicBezTo>
+                  <a:pt x="249620" y="940419"/>
+                  <a:pt x="243305" y="955902"/>
+                  <a:pt x="234752" y="970156"/>
+                </a:cubicBezTo>
+                <a:cubicBezTo>
+                  <a:pt x="220961" y="993140"/>
+                  <a:pt x="205015" y="1014761"/>
+                  <a:pt x="190147" y="1037063"/>
+                </a:cubicBezTo>
+                <a:lnTo>
+                  <a:pt x="167844" y="1070517"/>
+                </a:lnTo>
+                <a:cubicBezTo>
+                  <a:pt x="164127" y="1092819"/>
+                  <a:pt x="164632" y="1116254"/>
+                  <a:pt x="156693" y="1137424"/>
+                </a:cubicBezTo>
+                <a:cubicBezTo>
+                  <a:pt x="153002" y="1147268"/>
+                  <a:pt x="139093" y="1150323"/>
+                  <a:pt x="134391" y="1159727"/>
+                </a:cubicBezTo>
+                <a:cubicBezTo>
+                  <a:pt x="123878" y="1180754"/>
+                  <a:pt x="119522" y="1204332"/>
+                  <a:pt x="112088" y="1226634"/>
+                </a:cubicBezTo>
+                <a:cubicBezTo>
+                  <a:pt x="108371" y="1237785"/>
+                  <a:pt x="103788" y="1248684"/>
+                  <a:pt x="100937" y="1260088"/>
+                </a:cubicBezTo>
+                <a:cubicBezTo>
+                  <a:pt x="97220" y="1274956"/>
+                  <a:pt x="96640" y="1290984"/>
+                  <a:pt x="89786" y="1304692"/>
+                </a:cubicBezTo>
+                <a:cubicBezTo>
+                  <a:pt x="81474" y="1321315"/>
+                  <a:pt x="67483" y="1334429"/>
+                  <a:pt x="56332" y="1349297"/>
+                </a:cubicBezTo>
+                <a:cubicBezTo>
+                  <a:pt x="52615" y="1367882"/>
+                  <a:pt x="49292" y="1386551"/>
+                  <a:pt x="45181" y="1405053"/>
+                </a:cubicBezTo>
+                <a:cubicBezTo>
+                  <a:pt x="41856" y="1420014"/>
+                  <a:pt x="37241" y="1434672"/>
+                  <a:pt x="34030" y="1449658"/>
+                </a:cubicBezTo>
+                <a:cubicBezTo>
+                  <a:pt x="26087" y="1486723"/>
+                  <a:pt x="11727" y="1561170"/>
+                  <a:pt x="11727" y="1561170"/>
+                </a:cubicBezTo>
+                <a:cubicBezTo>
+                  <a:pt x="5287" y="1767261"/>
+                  <a:pt x="-11086" y="1880475"/>
+                  <a:pt x="11727" y="2062975"/>
+                </a:cubicBezTo>
+                <a:cubicBezTo>
+                  <a:pt x="17031" y="2105409"/>
+                  <a:pt x="27859" y="2090907"/>
+                  <a:pt x="45181" y="2129883"/>
+                </a:cubicBezTo>
+                <a:cubicBezTo>
+                  <a:pt x="54729" y="2151366"/>
+                  <a:pt x="54443" y="2177230"/>
+                  <a:pt x="67483" y="2196790"/>
+                </a:cubicBezTo>
+                <a:cubicBezTo>
+                  <a:pt x="74917" y="2207941"/>
+                  <a:pt x="81206" y="2219948"/>
+                  <a:pt x="89786" y="2230244"/>
+                </a:cubicBezTo>
+                <a:cubicBezTo>
+                  <a:pt x="113622" y="2258846"/>
+                  <a:pt x="137447" y="2275439"/>
+                  <a:pt x="167844" y="2297151"/>
+                </a:cubicBezTo>
+                <a:cubicBezTo>
+                  <a:pt x="178750" y="2304941"/>
+                  <a:pt x="189311" y="2313459"/>
+                  <a:pt x="201298" y="2319453"/>
+                </a:cubicBezTo>
+                <a:cubicBezTo>
+                  <a:pt x="211812" y="2324710"/>
+                  <a:pt x="224238" y="2325348"/>
+                  <a:pt x="234752" y="2330605"/>
+                </a:cubicBezTo>
+                <a:cubicBezTo>
+                  <a:pt x="246739" y="2336599"/>
+                  <a:pt x="255958" y="2347464"/>
+                  <a:pt x="268205" y="2352907"/>
+                </a:cubicBezTo>
+                <a:cubicBezTo>
+                  <a:pt x="289688" y="2362455"/>
+                  <a:pt x="335113" y="2375209"/>
+                  <a:pt x="335113" y="2375209"/>
+                </a:cubicBezTo>
+                <a:lnTo>
+                  <a:pt x="435474" y="2341756"/>
+                </a:lnTo>
+                <a:cubicBezTo>
+                  <a:pt x="446625" y="2338039"/>
+                  <a:pt x="457524" y="2333456"/>
+                  <a:pt x="468927" y="2330605"/>
+                </a:cubicBezTo>
+                <a:cubicBezTo>
+                  <a:pt x="483795" y="2326888"/>
+                  <a:pt x="498796" y="2323663"/>
+                  <a:pt x="513532" y="2319453"/>
+                </a:cubicBezTo>
+                <a:cubicBezTo>
+                  <a:pt x="524834" y="2316224"/>
+                  <a:pt x="535460" y="2310607"/>
+                  <a:pt x="546986" y="2308302"/>
+                </a:cubicBezTo>
+                <a:cubicBezTo>
+                  <a:pt x="572759" y="2303147"/>
+                  <a:pt x="599025" y="2300868"/>
+                  <a:pt x="625044" y="2297151"/>
+                </a:cubicBezTo>
+                <a:cubicBezTo>
+                  <a:pt x="632478" y="2289717"/>
+                  <a:pt x="657321" y="2271523"/>
+                  <a:pt x="647347" y="2274848"/>
+                </a:cubicBezTo>
+                <a:cubicBezTo>
+                  <a:pt x="525327" y="2315524"/>
+                  <a:pt x="710154" y="2250651"/>
+                  <a:pt x="580440" y="2308302"/>
+                </a:cubicBezTo>
+                <a:cubicBezTo>
+                  <a:pt x="558957" y="2317850"/>
+                  <a:pt x="535835" y="2323171"/>
+                  <a:pt x="513532" y="2330605"/>
+                </a:cubicBezTo>
+                <a:cubicBezTo>
+                  <a:pt x="502381" y="2334322"/>
+                  <a:pt x="489859" y="2335236"/>
+                  <a:pt x="480079" y="2341756"/>
+                </a:cubicBezTo>
+                <a:cubicBezTo>
+                  <a:pt x="468928" y="2349190"/>
+                  <a:pt x="458612" y="2358065"/>
+                  <a:pt x="446625" y="2364058"/>
+                </a:cubicBezTo>
+                <a:cubicBezTo>
+                  <a:pt x="436111" y="2369315"/>
+                  <a:pt x="401416" y="2375209"/>
+                  <a:pt x="413171" y="2375209"/>
+                </a:cubicBezTo>
+                <a:cubicBezTo>
+                  <a:pt x="432646" y="2375209"/>
+                  <a:pt x="492028" y="2357208"/>
+                  <a:pt x="513532" y="2352907"/>
+                </a:cubicBezTo>
+                <a:cubicBezTo>
+                  <a:pt x="535703" y="2348473"/>
+                  <a:pt x="558137" y="2345473"/>
+                  <a:pt x="580440" y="2341756"/>
+                </a:cubicBezTo>
+                <a:cubicBezTo>
+                  <a:pt x="587874" y="2334322"/>
+                  <a:pt x="593338" y="2324155"/>
+                  <a:pt x="602742" y="2319453"/>
+                </a:cubicBezTo>
+                <a:cubicBezTo>
+                  <a:pt x="623769" y="2308940"/>
+                  <a:pt x="669649" y="2297151"/>
+                  <a:pt x="669649" y="2297151"/>
+                </a:cubicBezTo>
+                <a:cubicBezTo>
+                  <a:pt x="708576" y="2258224"/>
+                  <a:pt x="701926" y="2271523"/>
+                  <a:pt x="625044" y="2297151"/>
+                </a:cubicBezTo>
+                <a:lnTo>
+                  <a:pt x="558137" y="2319453"/>
+                </a:lnTo>
+                <a:cubicBezTo>
+                  <a:pt x="546986" y="2323170"/>
+                  <a:pt x="534463" y="2324085"/>
+                  <a:pt x="524683" y="2330605"/>
+                </a:cubicBezTo>
+                <a:cubicBezTo>
+                  <a:pt x="513532" y="2338039"/>
+                  <a:pt x="503477" y="2347464"/>
+                  <a:pt x="491230" y="2352907"/>
+                </a:cubicBezTo>
+                <a:cubicBezTo>
+                  <a:pt x="469747" y="2362455"/>
+                  <a:pt x="424322" y="2375209"/>
+                  <a:pt x="424322" y="2375209"/>
+                </a:cubicBezTo>
+                <a:cubicBezTo>
+                  <a:pt x="416888" y="2382643"/>
+                  <a:pt x="398695" y="2387538"/>
+                  <a:pt x="402020" y="2397512"/>
+                </a:cubicBezTo>
+                <a:cubicBezTo>
+                  <a:pt x="405737" y="2408663"/>
+                  <a:pt x="424134" y="2405570"/>
+                  <a:pt x="435474" y="2408663"/>
+                </a:cubicBezTo>
+                <a:cubicBezTo>
+                  <a:pt x="465045" y="2416728"/>
+                  <a:pt x="495604" y="2421273"/>
+                  <a:pt x="524683" y="2430966"/>
+                </a:cubicBezTo>
+                <a:cubicBezTo>
+                  <a:pt x="683700" y="2483970"/>
+                  <a:pt x="518215" y="2430711"/>
+                  <a:pt x="636196" y="2464419"/>
+                </a:cubicBezTo>
+                <a:cubicBezTo>
+                  <a:pt x="647498" y="2467648"/>
+                  <a:pt x="658123" y="2473265"/>
+                  <a:pt x="669649" y="2475570"/>
+                </a:cubicBezTo>
+                <a:cubicBezTo>
+                  <a:pt x="730664" y="2487773"/>
+                  <a:pt x="728326" y="2486722"/>
+                  <a:pt x="770010" y="2486722"/>
+                </a:cubicBezTo>
+              </a:path>
+            </a:pathLst>
+          </a:custGeom>
+          <a:ln>
+            <a:solidFill>
+              <a:srgbClr val="0070C0"/>
+            </a:solidFill>
+          </a:ln>
+        </p:spPr>
+        <p:style>
+          <a:lnRef idx="3">
+            <a:schemeClr val="accent1"/>
+          </a:lnRef>
+          <a:fillRef idx="0">
+            <a:schemeClr val="accent1"/>
+          </a:fillRef>
+          <a:effectRef idx="2">
+            <a:schemeClr val="accent1"/>
+          </a:effectRef>
+          <a:fontRef idx="minor">
+            <a:schemeClr val="tx1"/>
+          </a:fontRef>
+        </p:style>
+        <p:txBody>
+          <a:bodyPr rtlCol="0" anchor="ctr"/>
+          <a:lstStyle/>
+          <a:p>
+            <a:pPr algn="ctr"/>
+            <a:endParaRPr lang="en-US"/>
           </a:p>
         </p:txBody>
       </p:sp>
     </p:spTree>
     <p:extLst>
       <p:ext uri="{BB962C8B-B14F-4D97-AF65-F5344CB8AC3E}">
-        <p14:creationId xmlns:p14="http://schemas.microsoft.com/office/powerpoint/2010/main" val="3893224695"/>
+        <p14:creationId xmlns:p14="http://schemas.microsoft.com/office/powerpoint/2010/main" val="2401587159"/>
       </p:ext>
     </p:extLst>
   </p:cSld>
@@ -4435,7 +6477,7 @@
           <p:cNvPr id="2" name="Title 1">
             <a:extLst>
               <a:ext uri="{FF2B5EF4-FFF2-40B4-BE49-F238E27FC236}">
-                <a16:creationId xmlns:a16="http://schemas.microsoft.com/office/drawing/2014/main" id="{8F5541F5-9B9E-944A-9092-D92F1DE173A1}"/>
+                <a16:creationId xmlns:a16="http://schemas.microsoft.com/office/drawing/2014/main" id="{C3AED0BC-26D8-FE4B-A381-F6BC83B56BA9}"/>
               </a:ext>
             </a:extLst>
           </p:cNvPr>
@@ -4452,12 +6494,8 @@
           <a:lstStyle/>
           <a:p>
             <a:r>
-              <a:rPr lang="en-US" dirty="0" err="1"/>
-              <a:t>Accessment</a:t>
-            </a:r>
-            <a:r>
               <a:rPr lang="en-US" dirty="0"/>
-              <a:t> Criteria</a:t>
+              <a:t>Technical Mandatory</a:t>
             </a:r>
           </a:p>
         </p:txBody>
@@ -4467,7 +6505,7 @@
           <p:cNvPr id="3" name="Content Placeholder 2">
             <a:extLst>
               <a:ext uri="{FF2B5EF4-FFF2-40B4-BE49-F238E27FC236}">
-                <a16:creationId xmlns:a16="http://schemas.microsoft.com/office/drawing/2014/main" id="{F205189A-6FE3-2E4C-AC9C-9C0E138CBB26}"/>
+                <a16:creationId xmlns:a16="http://schemas.microsoft.com/office/drawing/2014/main" id="{8F5E59CD-A072-7041-B237-B8406D25BE17}"/>
               </a:ext>
             </a:extLst>
           </p:cNvPr>
@@ -4478,141 +6516,87 @@
             <p:ph idx="1"/>
           </p:nvPr>
         </p:nvSpPr>
-        <p:spPr/>
-        <p:txBody>
-          <a:bodyPr numCol="2">
-            <a:normAutofit fontScale="55000" lnSpcReduction="20000"/>
+        <p:spPr>
+          <a:xfrm>
+            <a:off x="838200" y="1825625"/>
+            <a:ext cx="5257800" cy="4351338"/>
+          </a:xfrm>
+        </p:spPr>
+        <p:txBody>
+          <a:bodyPr>
+            <a:normAutofit fontScale="62500" lnSpcReduction="20000"/>
           </a:bodyPr>
           <a:lstStyle/>
           <a:p>
             <a:r>
               <a:rPr lang="en-US" dirty="0"/>
-              <a:t>Create structured HTML &amp; CSS code.</a:t>
+              <a:t>The project is a mobile web app</a:t>
             </a:r>
           </a:p>
           <a:p>
             <a:r>
               <a:rPr lang="en-US" dirty="0"/>
-              <a:t>Apply front-end best practices.</a:t>
+              <a:t>The database should have at least 2 tables — in this example, things to measure and measurements, </a:t>
             </a:r>
           </a:p>
           <a:p>
             <a:r>
               <a:rPr lang="en-US" dirty="0"/>
-              <a:t>Ability to create UIs adjusted to given designs.</a:t>
+              <a:t>You should use Postgres as your database</a:t>
             </a:r>
           </a:p>
           <a:p>
             <a:r>
               <a:rPr lang="en-US" dirty="0"/>
-              <a:t>Implement basic OOP principles (encapsulation, inheritance, abstraction, polymorphism) in Ruby</a:t>
-            </a:r>
-          </a:p>
-          <a:p>
+              <a:t>For the back-end you will use Ruby on Rails </a:t>
+            </a:r>
+          </a:p>
+          <a:p>
+            <a:pPr lvl="1"/>
             <a:r>
               <a:rPr lang="en-US" dirty="0"/>
-              <a:t>Design DB schema based on real life example</a:t>
+              <a:t>You will create a REST API to manage database resources, in this case, measurements (things to measure could be added manually to the database or from an admin panel)</a:t>
             </a:r>
           </a:p>
           <a:p>
             <a:r>
               <a:rPr lang="en-US" dirty="0"/>
-              <a:t>Use MVP to structure backend code</a:t>
-            </a:r>
-          </a:p>
-          <a:p>
+              <a:t>For the front-end you will use React </a:t>
+            </a:r>
+          </a:p>
+          <a:p>
+            <a:pPr lvl="1"/>
             <a:r>
               <a:rPr lang="en-US" dirty="0"/>
-              <a:t>Implement basic CRUD operations</a:t>
-            </a:r>
-          </a:p>
-          <a:p>
+              <a:t>Connects to the back-end API to send and receive domain data</a:t>
+            </a:r>
+          </a:p>
+          <a:p>
+            <a:pPr lvl="1"/>
             <a:r>
               <a:rPr lang="en-US" dirty="0"/>
-              <a:t>Implement Active Record associations to model real life system</a:t>
-            </a:r>
-          </a:p>
-          <a:p>
+              <a:t>With routes for each of the screens, so the user can easily go back and forward</a:t>
+            </a:r>
+          </a:p>
+          <a:p>
+            <a:pPr lvl="1"/>
             <a:r>
               <a:rPr lang="en-US" dirty="0"/>
-              <a:t>Implement a RESTful API with proper routes</a:t>
+              <a:t>Using redux to store info used across the app, like the username</a:t>
             </a:r>
           </a:p>
           <a:p>
             <a:r>
               <a:rPr lang="en-US" dirty="0"/>
-              <a:t>Apply back-end best practices.</a:t>
-            </a:r>
-          </a:p>
-          <a:p>
-            <a:r>
-              <a:rPr lang="en-US" dirty="0"/>
-              <a:t>Send and receive data from a back-end endpoint</a:t>
-            </a:r>
-          </a:p>
-          <a:p>
-            <a:r>
-              <a:rPr lang="en-US" dirty="0"/>
-              <a:t>Implement interactive application respond to user interactions</a:t>
-            </a:r>
-          </a:p>
-          <a:p>
-            <a:r>
-              <a:rPr lang="en-US" dirty="0"/>
-              <a:t>Design a components structure for a website</a:t>
-            </a:r>
-          </a:p>
-          <a:p>
-            <a:r>
-              <a:rPr lang="en-US" dirty="0"/>
-              <a:t>Understand data management in front-end components</a:t>
-            </a:r>
-          </a:p>
-          <a:p>
-            <a:r>
-              <a:rPr lang="en-US" dirty="0"/>
-              <a:t>Manage front-end data using a shared state pattern</a:t>
-            </a:r>
-          </a:p>
-          <a:p>
-            <a:r>
-              <a:rPr lang="en-US" dirty="0"/>
-              <a:t>Ability to provide, as well as receive, feedback collaboratively and in a constructive manner. Coachable.</a:t>
-            </a:r>
-          </a:p>
-          <a:p>
-            <a:r>
-              <a:rPr lang="en-US" dirty="0"/>
-              <a:t>Never done learning and always seeking to improve themselves. Curious about new possibilities and acts to explore them.</a:t>
-            </a:r>
-          </a:p>
-          <a:p>
-            <a:r>
-              <a:rPr lang="en-US" dirty="0"/>
-              <a:t>Ability to perform tasks and complete projects with minimal supervision.</a:t>
-            </a:r>
-          </a:p>
-          <a:p>
-            <a:r>
-              <a:rPr lang="en-US" dirty="0"/>
-              <a:t>Ability to multitask and effectively manage time and prioritization.</a:t>
-            </a:r>
-          </a:p>
-          <a:p>
-            <a:r>
-              <a:rPr lang="en-US" dirty="0"/>
-              <a:t>Follow a industry standard workflow with version control system tools.</a:t>
-            </a:r>
-          </a:p>
-          <a:p>
-            <a:endParaRPr lang="en-US" dirty="0"/>
+              <a:t>The project will be deployed and accessible online</a:t>
+            </a:r>
           </a:p>
         </p:txBody>
       </p:sp>
     </p:spTree>
     <p:extLst>
       <p:ext uri="{BB962C8B-B14F-4D97-AF65-F5344CB8AC3E}">
-        <p14:creationId xmlns:p14="http://schemas.microsoft.com/office/powerpoint/2010/main" val="4051499856"/>
+        <p14:creationId xmlns:p14="http://schemas.microsoft.com/office/powerpoint/2010/main" val="3710473357"/>
       </p:ext>
     </p:extLst>
   </p:cSld>

</xml_diff>